<commit_message>
DOCUMENTO DE TESIS CON FORMATO - CAPS 4 Y 5
</commit_message>
<xml_diff>
--- a/Documentación/Presentaciones PPT/Tesis 2 - Mendez Presentación.pptx
+++ b/Documentación/Presentaciones PPT/Tesis 2 - Mendez Presentación.pptx
@@ -3829,118 +3829,7 @@
         </a:p>
       </dgm:t>
     </dgm:pt>
-    <dgm:pt modelId="{3BFDB7AE-EA70-4208-99E4-6652F73E09AF}">
-      <dgm:prSet phldrT="[Texto]"/>
-      <dgm:spPr/>
-      <dgm:t>
-        <a:bodyPr/>
-        <a:lstStyle/>
-        <a:p>
-          <a:r>
-            <a:rPr lang="es-PE" b="1" dirty="0" smtClean="0"/>
-            <a:t>Objetivo Específico 2 [OE2]</a:t>
-          </a:r>
-          <a:endParaRPr lang="es-PE" b="1" dirty="0"/>
-        </a:p>
-      </dgm:t>
-    </dgm:pt>
-    <dgm:pt modelId="{54A7580C-2761-4683-A631-30A94395D65A}" type="parTrans" cxnId="{E344A32A-539A-4B7E-ACFA-95DEF5620BA5}">
-      <dgm:prSet/>
-      <dgm:spPr/>
-      <dgm:t>
-        <a:bodyPr/>
-        <a:lstStyle/>
-        <a:p>
-          <a:endParaRPr lang="es-PE"/>
-        </a:p>
-      </dgm:t>
-    </dgm:pt>
-    <dgm:pt modelId="{9EFD2A57-70D2-4814-9534-F69C1AAF4BEC}" type="sibTrans" cxnId="{E344A32A-539A-4B7E-ACFA-95DEF5620BA5}">
-      <dgm:prSet/>
-      <dgm:spPr/>
-      <dgm:t>
-        <a:bodyPr/>
-        <a:lstStyle/>
-        <a:p>
-          <a:endParaRPr lang="es-PE"/>
-        </a:p>
-      </dgm:t>
-    </dgm:pt>
     <dgm:pt modelId="{A43E1EE4-EA84-469B-B8E9-F87184BCD406}">
-      <dgm:prSet phldrT="[Texto]" custT="1"/>
-      <dgm:spPr/>
-      <dgm:t>
-        <a:bodyPr/>
-        <a:lstStyle/>
-        <a:p>
-          <a:r>
-            <a:rPr lang="es-ES" sz="1600" dirty="0" smtClean="0"/>
-            <a:t>Definir las reglas y políticas de negocio que deben cumplir todos los actores involucrados.</a:t>
-          </a:r>
-          <a:endParaRPr lang="es-PE" sz="1600" dirty="0"/>
-        </a:p>
-      </dgm:t>
-    </dgm:pt>
-    <dgm:pt modelId="{B5EEE765-35D4-4DF0-BFEC-78B63BE24D65}" type="parTrans" cxnId="{C611089B-F9C4-4CB8-A2DC-4A6E2B8ECF02}">
-      <dgm:prSet/>
-      <dgm:spPr/>
-      <dgm:t>
-        <a:bodyPr/>
-        <a:lstStyle/>
-        <a:p>
-          <a:endParaRPr lang="es-PE"/>
-        </a:p>
-      </dgm:t>
-    </dgm:pt>
-    <dgm:pt modelId="{DFDEAEA3-03A5-44E8-ACA1-35C31669F285}" type="sibTrans" cxnId="{C611089B-F9C4-4CB8-A2DC-4A6E2B8ECF02}">
-      <dgm:prSet/>
-      <dgm:spPr/>
-      <dgm:t>
-        <a:bodyPr/>
-        <a:lstStyle/>
-        <a:p>
-          <a:endParaRPr lang="es-PE"/>
-        </a:p>
-      </dgm:t>
-    </dgm:pt>
-    <dgm:pt modelId="{924689B8-E4E2-4802-BC6B-5B17E3AC8DDF}">
-      <dgm:prSet phldrT="[Texto]" custT="1"/>
-      <dgm:spPr/>
-      <dgm:t>
-        <a:bodyPr/>
-        <a:lstStyle/>
-        <a:p>
-          <a:r>
-            <a:rPr lang="es-PE" sz="2000" b="1" dirty="0" smtClean="0"/>
-            <a:t>Objetivo Específico 3 [OE3]</a:t>
-          </a:r>
-          <a:endParaRPr lang="es-PE" sz="2000" b="1" dirty="0"/>
-        </a:p>
-      </dgm:t>
-    </dgm:pt>
-    <dgm:pt modelId="{A9E69FD6-91A0-40D3-96F5-93981AACB6C2}" type="sibTrans" cxnId="{5BEF8FBD-F7BC-444D-94D8-BB8E5A82AA43}">
-      <dgm:prSet/>
-      <dgm:spPr/>
-      <dgm:t>
-        <a:bodyPr/>
-        <a:lstStyle/>
-        <a:p>
-          <a:endParaRPr lang="es-PE"/>
-        </a:p>
-      </dgm:t>
-    </dgm:pt>
-    <dgm:pt modelId="{670CB166-EC54-4ECF-99EE-166A3C70F39E}" type="parTrans" cxnId="{5BEF8FBD-F7BC-444D-94D8-BB8E5A82AA43}">
-      <dgm:prSet/>
-      <dgm:spPr/>
-      <dgm:t>
-        <a:bodyPr/>
-        <a:lstStyle/>
-        <a:p>
-          <a:endParaRPr lang="es-PE"/>
-        </a:p>
-      </dgm:t>
-    </dgm:pt>
-    <dgm:pt modelId="{5D56325C-A28C-4982-810F-F3CCECEC2E7D}">
       <dgm:prSet phldrT="[Texto]" custT="1"/>
       <dgm:spPr/>
       <dgm:t>
@@ -4000,17 +3889,13 @@
           </a:r>
           <a:r>
             <a:rPr lang="es-ES" sz="1600" dirty="0" smtClean="0"/>
-            <a:t>Cierre y retroalimentación (</a:t>
-          </a:r>
-          <a:r>
-            <a:rPr lang="es-ES" sz="1600" smtClean="0"/>
-            <a:t>post-servicio)</a:t>
+            <a:t>Cierre y retroalimentación (post-servicio)</a:t>
           </a:r>
           <a:endParaRPr lang="es-PE" sz="1600" dirty="0"/>
         </a:p>
       </dgm:t>
     </dgm:pt>
-    <dgm:pt modelId="{5D99972C-BEA3-4759-BAAC-F0514ABC1FE1}" type="parTrans" cxnId="{2206174B-0967-4701-B7BB-572D079B3A22}">
+    <dgm:pt modelId="{B5EEE765-35D4-4DF0-BFEC-78B63BE24D65}" type="parTrans" cxnId="{C611089B-F9C4-4CB8-A2DC-4A6E2B8ECF02}">
       <dgm:prSet/>
       <dgm:spPr/>
       <dgm:t>
@@ -4021,7 +3906,56 @@
         </a:p>
       </dgm:t>
     </dgm:pt>
-    <dgm:pt modelId="{ECCC7701-505F-42F0-B3C4-E9890A7BB77B}" type="sibTrans" cxnId="{2206174B-0967-4701-B7BB-572D079B3A22}">
+    <dgm:pt modelId="{DFDEAEA3-03A5-44E8-ACA1-35C31669F285}" type="sibTrans" cxnId="{C611089B-F9C4-4CB8-A2DC-4A6E2B8ECF02}">
+      <dgm:prSet/>
+      <dgm:spPr/>
+      <dgm:t>
+        <a:bodyPr/>
+        <a:lstStyle/>
+        <a:p>
+          <a:endParaRPr lang="es-PE"/>
+        </a:p>
+      </dgm:t>
+    </dgm:pt>
+    <dgm:pt modelId="{924689B8-E4E2-4802-BC6B-5B17E3AC8DDF}">
+      <dgm:prSet phldrT="[Texto]" custT="1"/>
+      <dgm:spPr/>
+      <dgm:t>
+        <a:bodyPr/>
+        <a:lstStyle/>
+        <a:p>
+          <a:r>
+            <a:rPr lang="es-PE" sz="2000" b="1" dirty="0" smtClean="0"/>
+            <a:t>Objetivo Específico </a:t>
+          </a:r>
+          <a:r>
+            <a:rPr lang="es-PE" sz="2000" b="1" dirty="0" smtClean="0"/>
+            <a:t>3 </a:t>
+          </a:r>
+          <a:r>
+            <a:rPr lang="es-PE" sz="2000" b="1" dirty="0" smtClean="0"/>
+            <a:t>[</a:t>
+          </a:r>
+          <a:r>
+            <a:rPr lang="es-PE" sz="2000" b="1" dirty="0" smtClean="0"/>
+            <a:t>OE3]</a:t>
+          </a:r>
+          <a:endParaRPr lang="es-PE" sz="2000" b="1" dirty="0"/>
+        </a:p>
+      </dgm:t>
+    </dgm:pt>
+    <dgm:pt modelId="{A9E69FD6-91A0-40D3-96F5-93981AACB6C2}" type="sibTrans" cxnId="{5BEF8FBD-F7BC-444D-94D8-BB8E5A82AA43}">
+      <dgm:prSet/>
+      <dgm:spPr/>
+      <dgm:t>
+        <a:bodyPr/>
+        <a:lstStyle/>
+        <a:p>
+          <a:endParaRPr lang="es-PE"/>
+        </a:p>
+      </dgm:t>
+    </dgm:pt>
+    <dgm:pt modelId="{670CB166-EC54-4ECF-99EE-166A3C70F39E}" type="parTrans" cxnId="{5BEF8FBD-F7BC-444D-94D8-BB8E5A82AA43}">
       <dgm:prSet/>
       <dgm:spPr/>
       <dgm:t>
@@ -4059,6 +3993,84 @@
       </dgm:t>
     </dgm:pt>
     <dgm:pt modelId="{A1BF3405-CB09-4D5F-AAD9-E76A127FDC0C}" type="sibTrans" cxnId="{FB20BC1E-834C-48C0-BD4E-04A5E0873844}">
+      <dgm:prSet/>
+      <dgm:spPr/>
+      <dgm:t>
+        <a:bodyPr/>
+        <a:lstStyle/>
+        <a:p>
+          <a:endParaRPr lang="es-PE"/>
+        </a:p>
+      </dgm:t>
+    </dgm:pt>
+    <dgm:pt modelId="{5D56325C-A28C-4982-810F-F3CCECEC2E7D}">
+      <dgm:prSet phldrT="[Texto]" custT="1"/>
+      <dgm:spPr/>
+      <dgm:t>
+        <a:bodyPr/>
+        <a:lstStyle/>
+        <a:p>
+          <a:r>
+            <a:rPr lang="es-ES" sz="1600" dirty="0" smtClean="0"/>
+            <a:t>Definir las reglas y políticas de negocio que deben cumplir todos los actores involucrados.</a:t>
+          </a:r>
+          <a:endParaRPr lang="es-PE" sz="1600" dirty="0"/>
+        </a:p>
+      </dgm:t>
+    </dgm:pt>
+    <dgm:pt modelId="{3BFDB7AE-EA70-4208-99E4-6652F73E09AF}">
+      <dgm:prSet phldrT="[Texto]"/>
+      <dgm:spPr/>
+      <dgm:t>
+        <a:bodyPr/>
+        <a:lstStyle/>
+        <a:p>
+          <a:r>
+            <a:rPr lang="es-PE" b="1" dirty="0" smtClean="0"/>
+            <a:t>Objetivo Específico </a:t>
+          </a:r>
+          <a:r>
+            <a:rPr lang="es-PE" b="1" dirty="0" smtClean="0"/>
+            <a:t>2 [OE2]</a:t>
+          </a:r>
+          <a:endParaRPr lang="es-PE" b="1" dirty="0"/>
+        </a:p>
+      </dgm:t>
+    </dgm:pt>
+    <dgm:pt modelId="{9EFD2A57-70D2-4814-9534-F69C1AAF4BEC}" type="sibTrans" cxnId="{E344A32A-539A-4B7E-ACFA-95DEF5620BA5}">
+      <dgm:prSet/>
+      <dgm:spPr/>
+      <dgm:t>
+        <a:bodyPr/>
+        <a:lstStyle/>
+        <a:p>
+          <a:endParaRPr lang="es-PE"/>
+        </a:p>
+      </dgm:t>
+    </dgm:pt>
+    <dgm:pt modelId="{54A7580C-2761-4683-A631-30A94395D65A}" type="parTrans" cxnId="{E344A32A-539A-4B7E-ACFA-95DEF5620BA5}">
+      <dgm:prSet/>
+      <dgm:spPr/>
+      <dgm:t>
+        <a:bodyPr/>
+        <a:lstStyle/>
+        <a:p>
+          <a:endParaRPr lang="es-PE"/>
+        </a:p>
+      </dgm:t>
+    </dgm:pt>
+    <dgm:pt modelId="{ECCC7701-505F-42F0-B3C4-E9890A7BB77B}" type="sibTrans" cxnId="{2206174B-0967-4701-B7BB-572D079B3A22}">
+      <dgm:prSet/>
+      <dgm:spPr/>
+      <dgm:t>
+        <a:bodyPr/>
+        <a:lstStyle/>
+        <a:p>
+          <a:endParaRPr lang="es-PE"/>
+        </a:p>
+      </dgm:t>
+    </dgm:pt>
+    <dgm:pt modelId="{5D99972C-BEA3-4759-BAAC-F0514ABC1FE1}" type="parTrans" cxnId="{2206174B-0967-4701-B7BB-572D079B3A22}">
       <dgm:prSet/>
       <dgm:spPr/>
       <dgm:t>
@@ -4561,15 +4573,7 @@
         <a:p>
           <a:r>
             <a:rPr lang="es-ES" sz="1600" dirty="0" smtClean="0"/>
-            <a:t>Implementar un proceso de búsqueda para la asignación automática </a:t>
-          </a:r>
-          <a:r>
-            <a:rPr lang="es-ES" sz="1600" dirty="0" smtClean="0"/>
-            <a:t>de los mejores proveedores </a:t>
-          </a:r>
-          <a:r>
-            <a:rPr lang="es-ES" sz="1600" dirty="0" smtClean="0"/>
-            <a:t>al cliente basada en el algoritmo Tabú </a:t>
+            <a:t>Implementar un proceso de búsqueda para la asignación automática de los mejores proveedores al cliente basada en el algoritmo Tabú </a:t>
           </a:r>
           <a:r>
             <a:rPr lang="es-MX" sz="1600" dirty="0" smtClean="0"/>
@@ -4876,22 +4880,22 @@
     </dgm:pt>
   </dgm:ptLst>
   <dgm:cxnLst>
+    <dgm:cxn modelId="{5BEF8FBD-F7BC-444D-94D8-BB8E5A82AA43}" srcId="{9BF01063-3BAB-4F4D-ADE8-387A89D22F7C}" destId="{924689B8-E4E2-4802-BC6B-5B17E3AC8DDF}" srcOrd="2" destOrd="0" parTransId="{670CB166-EC54-4ECF-99EE-166A3C70F39E}" sibTransId="{A9E69FD6-91A0-40D3-96F5-93981AACB6C2}"/>
+    <dgm:cxn modelId="{4219486A-1AA6-4D7C-8DCD-F38DE310E10B}" type="presOf" srcId="{924689B8-E4E2-4802-BC6B-5B17E3AC8DDF}" destId="{E2ADE456-C079-4778-88D3-2ABF030BE345}" srcOrd="0" destOrd="0" presId="urn:microsoft.com/office/officeart/2005/8/layout/list1"/>
+    <dgm:cxn modelId="{A1CD1BE4-A834-4463-86D1-583A19E39584}" type="presOf" srcId="{9BF01063-3BAB-4F4D-ADE8-387A89D22F7C}" destId="{159D9149-F9AA-45E8-ABA6-7AC56A21C1F8}" srcOrd="0" destOrd="0" presId="urn:microsoft.com/office/officeart/2005/8/layout/list1"/>
+    <dgm:cxn modelId="{5D020E2A-D409-452B-ABB3-0EFE3A92652C}" type="presOf" srcId="{4C11F0D3-B1D8-41E5-B4ED-D28D5406ED7A}" destId="{C94856A0-C8B1-4244-B645-C266926A0AAB}" srcOrd="0" destOrd="0" presId="urn:microsoft.com/office/officeart/2005/8/layout/list1"/>
+    <dgm:cxn modelId="{FB20BC1E-834C-48C0-BD4E-04A5E0873844}" srcId="{4D5D3E7B-9F50-4387-AFBC-12316FB9B2E8}" destId="{4C11F0D3-B1D8-41E5-B4ED-D28D5406ED7A}" srcOrd="0" destOrd="0" parTransId="{C60CEBD2-531F-45D5-9CB2-1FBB715F4879}" sibTransId="{A1BF3405-CB09-4D5F-AAD9-E76A127FDC0C}"/>
+    <dgm:cxn modelId="{9738BE00-F026-4DB2-B7F4-EA1061D3A7FF}" type="presOf" srcId="{3BFDB7AE-EA70-4208-99E4-6652F73E09AF}" destId="{0F91977E-FD5F-4F09-AD28-B3380115D8C3}" srcOrd="0" destOrd="0" presId="urn:microsoft.com/office/officeart/2005/8/layout/list1"/>
+    <dgm:cxn modelId="{3B487C66-25D7-4E41-A5C2-F42C47637A7A}" type="presOf" srcId="{924689B8-E4E2-4802-BC6B-5B17E3AC8DDF}" destId="{E74DBF66-3AE1-4F14-A029-A5F2D0C36F78}" srcOrd="1" destOrd="0" presId="urn:microsoft.com/office/officeart/2005/8/layout/list1"/>
+    <dgm:cxn modelId="{26882D24-1258-440C-9950-32BA7E116E89}" type="presOf" srcId="{A43E1EE4-EA84-469B-B8E9-F87184BCD406}" destId="{FC04ED5C-48CE-49A3-98DF-4CA3B004B014}" srcOrd="0" destOrd="0" presId="urn:microsoft.com/office/officeart/2005/8/layout/list1"/>
+    <dgm:cxn modelId="{418BDB1E-B14B-41A7-9D8C-9C6887C8BC7F}" type="presOf" srcId="{4D5D3E7B-9F50-4387-AFBC-12316FB9B2E8}" destId="{15417C44-1630-41CC-AC5B-95723803EAAC}" srcOrd="1" destOrd="0" presId="urn:microsoft.com/office/officeart/2005/8/layout/list1"/>
     <dgm:cxn modelId="{78C0F103-0BC0-46BC-BBBC-D58341736E99}" type="presOf" srcId="{5D56325C-A28C-4982-810F-F3CCECEC2E7D}" destId="{3C682040-43AF-4BE8-950E-E13003E6C6C7}" srcOrd="0" destOrd="0" presId="urn:microsoft.com/office/officeart/2005/8/layout/list1"/>
+    <dgm:cxn modelId="{E344A32A-539A-4B7E-ACFA-95DEF5620BA5}" srcId="{9BF01063-3BAB-4F4D-ADE8-387A89D22F7C}" destId="{3BFDB7AE-EA70-4208-99E4-6652F73E09AF}" srcOrd="1" destOrd="0" parTransId="{54A7580C-2761-4683-A631-30A94395D65A}" sibTransId="{9EFD2A57-70D2-4814-9534-F69C1AAF4BEC}"/>
+    <dgm:cxn modelId="{108E09CC-8703-4C9A-9F4C-239B367EEF86}" type="presOf" srcId="{3BFDB7AE-EA70-4208-99E4-6652F73E09AF}" destId="{501DDC76-9B9F-4697-8027-10EB121BC8A9}" srcOrd="1" destOrd="0" presId="urn:microsoft.com/office/officeart/2005/8/layout/list1"/>
+    <dgm:cxn modelId="{DED07964-2F3D-434B-8896-63F590AFB3D4}" srcId="{9BF01063-3BAB-4F4D-ADE8-387A89D22F7C}" destId="{4D5D3E7B-9F50-4387-AFBC-12316FB9B2E8}" srcOrd="0" destOrd="0" parTransId="{4B140464-D0A6-4FE6-BFF1-D92A0DD7F2F3}" sibTransId="{86595B4C-0A5C-4BD5-A6B3-FDB543D91B73}"/>
     <dgm:cxn modelId="{2206174B-0967-4701-B7BB-572D079B3A22}" srcId="{3BFDB7AE-EA70-4208-99E4-6652F73E09AF}" destId="{5D56325C-A28C-4982-810F-F3CCECEC2E7D}" srcOrd="0" destOrd="0" parTransId="{5D99972C-BEA3-4759-BAAC-F0514ABC1FE1}" sibTransId="{ECCC7701-505F-42F0-B3C4-E9890A7BB77B}"/>
+    <dgm:cxn modelId="{D348ABC0-E7C5-475A-B6F1-B134560759E1}" type="presOf" srcId="{4D5D3E7B-9F50-4387-AFBC-12316FB9B2E8}" destId="{F126904A-86E7-4DEB-A715-98702053D074}" srcOrd="0" destOrd="0" presId="urn:microsoft.com/office/officeart/2005/8/layout/list1"/>
     <dgm:cxn modelId="{C611089B-F9C4-4CB8-A2DC-4A6E2B8ECF02}" srcId="{924689B8-E4E2-4802-BC6B-5B17E3AC8DDF}" destId="{A43E1EE4-EA84-469B-B8E9-F87184BCD406}" srcOrd="0" destOrd="0" parTransId="{B5EEE765-35D4-4DF0-BFEC-78B63BE24D65}" sibTransId="{DFDEAEA3-03A5-44E8-ACA1-35C31669F285}"/>
-    <dgm:cxn modelId="{FB20BC1E-834C-48C0-BD4E-04A5E0873844}" srcId="{4D5D3E7B-9F50-4387-AFBC-12316FB9B2E8}" destId="{4C11F0D3-B1D8-41E5-B4ED-D28D5406ED7A}" srcOrd="0" destOrd="0" parTransId="{C60CEBD2-531F-45D5-9CB2-1FBB715F4879}" sibTransId="{A1BF3405-CB09-4D5F-AAD9-E76A127FDC0C}"/>
-    <dgm:cxn modelId="{4219486A-1AA6-4D7C-8DCD-F38DE310E10B}" type="presOf" srcId="{924689B8-E4E2-4802-BC6B-5B17E3AC8DDF}" destId="{E2ADE456-C079-4778-88D3-2ABF030BE345}" srcOrd="0" destOrd="0" presId="urn:microsoft.com/office/officeart/2005/8/layout/list1"/>
-    <dgm:cxn modelId="{26882D24-1258-440C-9950-32BA7E116E89}" type="presOf" srcId="{A43E1EE4-EA84-469B-B8E9-F87184BCD406}" destId="{FC04ED5C-48CE-49A3-98DF-4CA3B004B014}" srcOrd="0" destOrd="0" presId="urn:microsoft.com/office/officeart/2005/8/layout/list1"/>
-    <dgm:cxn modelId="{108E09CC-8703-4C9A-9F4C-239B367EEF86}" type="presOf" srcId="{3BFDB7AE-EA70-4208-99E4-6652F73E09AF}" destId="{501DDC76-9B9F-4697-8027-10EB121BC8A9}" srcOrd="1" destOrd="0" presId="urn:microsoft.com/office/officeart/2005/8/layout/list1"/>
-    <dgm:cxn modelId="{5D020E2A-D409-452B-ABB3-0EFE3A92652C}" type="presOf" srcId="{4C11F0D3-B1D8-41E5-B4ED-D28D5406ED7A}" destId="{C94856A0-C8B1-4244-B645-C266926A0AAB}" srcOrd="0" destOrd="0" presId="urn:microsoft.com/office/officeart/2005/8/layout/list1"/>
-    <dgm:cxn modelId="{9738BE00-F026-4DB2-B7F4-EA1061D3A7FF}" type="presOf" srcId="{3BFDB7AE-EA70-4208-99E4-6652F73E09AF}" destId="{0F91977E-FD5F-4F09-AD28-B3380115D8C3}" srcOrd="0" destOrd="0" presId="urn:microsoft.com/office/officeart/2005/8/layout/list1"/>
-    <dgm:cxn modelId="{D348ABC0-E7C5-475A-B6F1-B134560759E1}" type="presOf" srcId="{4D5D3E7B-9F50-4387-AFBC-12316FB9B2E8}" destId="{F126904A-86E7-4DEB-A715-98702053D074}" srcOrd="0" destOrd="0" presId="urn:microsoft.com/office/officeart/2005/8/layout/list1"/>
-    <dgm:cxn modelId="{3B487C66-25D7-4E41-A5C2-F42C47637A7A}" type="presOf" srcId="{924689B8-E4E2-4802-BC6B-5B17E3AC8DDF}" destId="{E74DBF66-3AE1-4F14-A029-A5F2D0C36F78}" srcOrd="1" destOrd="0" presId="urn:microsoft.com/office/officeart/2005/8/layout/list1"/>
-    <dgm:cxn modelId="{A1CD1BE4-A834-4463-86D1-583A19E39584}" type="presOf" srcId="{9BF01063-3BAB-4F4D-ADE8-387A89D22F7C}" destId="{159D9149-F9AA-45E8-ABA6-7AC56A21C1F8}" srcOrd="0" destOrd="0" presId="urn:microsoft.com/office/officeart/2005/8/layout/list1"/>
-    <dgm:cxn modelId="{DED07964-2F3D-434B-8896-63F590AFB3D4}" srcId="{9BF01063-3BAB-4F4D-ADE8-387A89D22F7C}" destId="{4D5D3E7B-9F50-4387-AFBC-12316FB9B2E8}" srcOrd="0" destOrd="0" parTransId="{4B140464-D0A6-4FE6-BFF1-D92A0DD7F2F3}" sibTransId="{86595B4C-0A5C-4BD5-A6B3-FDB543D91B73}"/>
-    <dgm:cxn modelId="{E344A32A-539A-4B7E-ACFA-95DEF5620BA5}" srcId="{9BF01063-3BAB-4F4D-ADE8-387A89D22F7C}" destId="{3BFDB7AE-EA70-4208-99E4-6652F73E09AF}" srcOrd="1" destOrd="0" parTransId="{54A7580C-2761-4683-A631-30A94395D65A}" sibTransId="{9EFD2A57-70D2-4814-9534-F69C1AAF4BEC}"/>
-    <dgm:cxn modelId="{418BDB1E-B14B-41A7-9D8C-9C6887C8BC7F}" type="presOf" srcId="{4D5D3E7B-9F50-4387-AFBC-12316FB9B2E8}" destId="{15417C44-1630-41CC-AC5B-95723803EAAC}" srcOrd="1" destOrd="0" presId="urn:microsoft.com/office/officeart/2005/8/layout/list1"/>
-    <dgm:cxn modelId="{5BEF8FBD-F7BC-444D-94D8-BB8E5A82AA43}" srcId="{9BF01063-3BAB-4F4D-ADE8-387A89D22F7C}" destId="{924689B8-E4E2-4802-BC6B-5B17E3AC8DDF}" srcOrd="2" destOrd="0" parTransId="{670CB166-EC54-4ECF-99EE-166A3C70F39E}" sibTransId="{A9E69FD6-91A0-40D3-96F5-93981AACB6C2}"/>
     <dgm:cxn modelId="{BE00BBB3-1184-461B-97F7-D315BDD3D691}" type="presParOf" srcId="{159D9149-F9AA-45E8-ABA6-7AC56A21C1F8}" destId="{1063D51E-A931-450E-B6C9-26E16E6105C8}" srcOrd="0" destOrd="0" presId="urn:microsoft.com/office/officeart/2005/8/layout/list1"/>
     <dgm:cxn modelId="{79CF50A7-E302-42DE-B4FA-14593CA58892}" type="presParOf" srcId="{1063D51E-A931-450E-B6C9-26E16E6105C8}" destId="{F126904A-86E7-4DEB-A715-98702053D074}" srcOrd="0" destOrd="0" presId="urn:microsoft.com/office/officeart/2005/8/layout/list1"/>
     <dgm:cxn modelId="{3ABCB8CF-0045-4A73-BD75-619AA227F38A}" type="presParOf" srcId="{1063D51E-A931-450E-B6C9-26E16E6105C8}" destId="{15417C44-1630-41CC-AC5B-95723803EAAC}" srcOrd="1" destOrd="0" presId="urn:microsoft.com/office/officeart/2005/8/layout/list1"/>
@@ -5054,7 +5058,15 @@
         <a:p>
           <a:r>
             <a:rPr lang="es-PE" sz="1400" dirty="0" smtClean="0"/>
-            <a:t>Documento que contiene los diagramas de procesos de negocio mencionados en el objetivo específico 2.</a:t>
+            <a:t>Documento que contiene y describe todas las reglas y políticas de negocio que deben ser cumplidas por </a:t>
+          </a:r>
+          <a:r>
+            <a:rPr lang="es-ES" sz="1400" dirty="0" smtClean="0"/>
+            <a:t>clientes, proveedores y suministradores </a:t>
+          </a:r>
+          <a:r>
+            <a:rPr lang="es-PE" sz="1400" dirty="0" smtClean="0"/>
+            <a:t>a fin de poder llevar a cabo el caso de negocio.</a:t>
           </a:r>
           <a:endParaRPr lang="es-PE" sz="1400" dirty="0"/>
         </a:p>
@@ -5128,15 +5140,7 @@
         <a:p>
           <a:r>
             <a:rPr lang="es-PE" sz="1400" dirty="0" smtClean="0"/>
-            <a:t>Documento que contiene y describe todas las reglas y políticas de negocio que deben ser cumplidas por </a:t>
-          </a:r>
-          <a:r>
-            <a:rPr lang="es-ES" sz="1400" dirty="0" smtClean="0"/>
-            <a:t>clientes, proveedores y suministradores </a:t>
-          </a:r>
-          <a:r>
-            <a:rPr lang="es-PE" sz="1400" dirty="0" smtClean="0"/>
-            <a:t>a fin de poder llevar a cabo el caso de negocio.</a:t>
+            <a:t>Documento que contiene los diagramas de procesos de negocio mencionados en el objetivo específico 3.</a:t>
           </a:r>
           <a:endParaRPr lang="es-PE" sz="1400" dirty="0"/>
         </a:p>
@@ -5210,15 +5214,7 @@
         <a:p>
           <a:r>
             <a:rPr lang="es-PE" sz="1400" dirty="0" smtClean="0"/>
-            <a:t>Documento que contiene en lenguaje natural y en español el pseudocódigo del algoritmo Tabú para la asignación </a:t>
-          </a:r>
-          <a:r>
-            <a:rPr lang="es-PE" sz="1400" dirty="0" smtClean="0"/>
-            <a:t>de los mejores proveedores </a:t>
-          </a:r>
-          <a:r>
-            <a:rPr lang="es-PE" sz="1400" dirty="0" smtClean="0"/>
-            <a:t>al cliente, dados los factores mencionados en el objetivo específico 4.</a:t>
+            <a:t>Documento que contiene en lenguaje natural y en español el pseudocódigo del algoritmo Tabú para la asignación de los mejores proveedores al cliente, dados los factores mencionados en el objetivo específico 4.</a:t>
           </a:r>
           <a:endParaRPr lang="es-PE" sz="1400" dirty="0"/>
         </a:p>
@@ -5471,7 +5467,7 @@
       </dgm:t>
     </dgm:pt>
     <dgm:pt modelId="{123E87A1-D0D6-46FD-AD18-592C1BD4BACE}" type="pres">
-      <dgm:prSet presAssocID="{435DC60F-67DF-4C3F-8884-A3E18B4F7F92}" presName="descendantText" presStyleLbl="alignAccFollowNode1" presStyleIdx="1" presStyleCnt="6" custScaleX="132134">
+      <dgm:prSet presAssocID="{435DC60F-67DF-4C3F-8884-A3E18B4F7F92}" presName="descendantText" presStyleLbl="alignAccFollowNode1" presStyleIdx="1" presStyleCnt="6" custScaleX="132134" custScaleY="111236">
         <dgm:presLayoutVars>
           <dgm:bulletEnabled val="1"/>
         </dgm:presLayoutVars>
@@ -5494,7 +5490,7 @@
       <dgm:spPr/>
     </dgm:pt>
     <dgm:pt modelId="{B3F5683C-6936-44A0-9206-6A2FB0D41DEA}" type="pres">
-      <dgm:prSet presAssocID="{BB7FC414-5851-4AE2-B36B-DDDACD64A9D9}" presName="parentText" presStyleLbl="node1" presStyleIdx="2" presStyleCnt="6" custScaleX="28022" custScaleY="128064">
+      <dgm:prSet presAssocID="{BB7FC414-5851-4AE2-B36B-DDDACD64A9D9}" presName="parentText" presStyleLbl="node1" presStyleIdx="2" presStyleCnt="6" custScaleX="28022" custScaleY="94353">
         <dgm:presLayoutVars>
           <dgm:chMax val="1"/>
           <dgm:bulletEnabled val="1"/>
@@ -5510,7 +5506,7 @@
       </dgm:t>
     </dgm:pt>
     <dgm:pt modelId="{AFC1D999-AB59-46E9-9D86-EC2926324F27}" type="pres">
-      <dgm:prSet presAssocID="{BB7FC414-5851-4AE2-B36B-DDDACD64A9D9}" presName="descendantText" presStyleLbl="alignAccFollowNode1" presStyleIdx="2" presStyleCnt="6" custScaleX="130731" custScaleY="141667">
+      <dgm:prSet presAssocID="{BB7FC414-5851-4AE2-B36B-DDDACD64A9D9}" presName="descendantText" presStyleLbl="alignAccFollowNode1" presStyleIdx="2" presStyleCnt="6" custScaleX="130731" custScaleY="101072">
         <dgm:presLayoutVars>
           <dgm:bulletEnabled val="1"/>
         </dgm:presLayoutVars>
@@ -6272,6 +6268,164 @@
       <dsp:spPr>
         <a:xfrm>
           <a:off x="0" y="1486946"/>
+          <a:ext cx="8136904" cy="960750"/>
+        </a:xfrm>
+        <a:prstGeom prst="rect">
+          <a:avLst/>
+        </a:prstGeom>
+        <a:solidFill>
+          <a:schemeClr val="lt1">
+            <a:alpha val="90000"/>
+            <a:hueOff val="0"/>
+            <a:satOff val="0"/>
+            <a:lumOff val="0"/>
+            <a:alphaOff val="0"/>
+          </a:schemeClr>
+        </a:solidFill>
+        <a:ln w="25400" cap="flat" cmpd="sng" algn="ctr">
+          <a:solidFill>
+            <a:schemeClr val="accent6">
+              <a:hueOff val="0"/>
+              <a:satOff val="0"/>
+              <a:lumOff val="0"/>
+              <a:alphaOff val="0"/>
+            </a:schemeClr>
+          </a:solidFill>
+          <a:prstDash val="solid"/>
+        </a:ln>
+        <a:effectLst/>
+      </dsp:spPr>
+      <dsp:style>
+        <a:lnRef idx="2">
+          <a:scrgbClr r="0" g="0" b="0"/>
+        </a:lnRef>
+        <a:fillRef idx="1">
+          <a:scrgbClr r="0" g="0" b="0"/>
+        </a:fillRef>
+        <a:effectRef idx="0">
+          <a:scrgbClr r="0" g="0" b="0"/>
+        </a:effectRef>
+        <a:fontRef idx="minor"/>
+      </dsp:style>
+      <dsp:txBody>
+        <a:bodyPr spcFirstLastPara="0" vert="horz" wrap="square" lIns="631514" tIns="416560" rIns="631514" bIns="113792" numCol="1" spcCol="1270" anchor="t" anchorCtr="0">
+          <a:noAutofit/>
+        </a:bodyPr>
+        <a:lstStyle/>
+        <a:p>
+          <a:pPr marL="171450" lvl="1" indent="-171450" algn="l" defTabSz="711200">
+            <a:lnSpc>
+              <a:spcPct val="90000"/>
+            </a:lnSpc>
+            <a:spcBef>
+              <a:spcPct val="0"/>
+            </a:spcBef>
+            <a:spcAft>
+              <a:spcPct val="15000"/>
+            </a:spcAft>
+            <a:buChar char="••"/>
+          </a:pPr>
+          <a:r>
+            <a:rPr lang="es-ES" sz="1600" kern="1200" dirty="0" smtClean="0"/>
+            <a:t>Definir las reglas y políticas de negocio que deben cumplir todos los actores involucrados.</a:t>
+          </a:r>
+          <a:endParaRPr lang="es-PE" sz="1600" kern="1200" dirty="0"/>
+        </a:p>
+      </dsp:txBody>
+      <dsp:txXfrm>
+        <a:off x="0" y="1486946"/>
+        <a:ext cx="8136904" cy="960750"/>
+      </dsp:txXfrm>
+    </dsp:sp>
+    <dsp:sp modelId="{501DDC76-9B9F-4697-8027-10EB121BC8A9}">
+      <dsp:nvSpPr>
+        <dsp:cNvPr id="0" name=""/>
+        <dsp:cNvSpPr/>
+      </dsp:nvSpPr>
+      <dsp:spPr>
+        <a:xfrm>
+          <a:off x="406845" y="1191746"/>
+          <a:ext cx="5695832" cy="590400"/>
+        </a:xfrm>
+        <a:prstGeom prst="roundRect">
+          <a:avLst/>
+        </a:prstGeom>
+        <a:solidFill>
+          <a:schemeClr val="accent6">
+            <a:hueOff val="0"/>
+            <a:satOff val="0"/>
+            <a:lumOff val="0"/>
+            <a:alphaOff val="0"/>
+          </a:schemeClr>
+        </a:solidFill>
+        <a:ln w="25400" cap="flat" cmpd="sng" algn="ctr">
+          <a:solidFill>
+            <a:schemeClr val="lt1">
+              <a:hueOff val="0"/>
+              <a:satOff val="0"/>
+              <a:lumOff val="0"/>
+              <a:alphaOff val="0"/>
+            </a:schemeClr>
+          </a:solidFill>
+          <a:prstDash val="solid"/>
+        </a:ln>
+        <a:effectLst/>
+      </dsp:spPr>
+      <dsp:style>
+        <a:lnRef idx="2">
+          <a:scrgbClr r="0" g="0" b="0"/>
+        </a:lnRef>
+        <a:fillRef idx="1">
+          <a:scrgbClr r="0" g="0" b="0"/>
+        </a:fillRef>
+        <a:effectRef idx="0">
+          <a:scrgbClr r="0" g="0" b="0"/>
+        </a:effectRef>
+        <a:fontRef idx="minor">
+          <a:schemeClr val="lt1"/>
+        </a:fontRef>
+      </dsp:style>
+      <dsp:txBody>
+        <a:bodyPr spcFirstLastPara="0" vert="horz" wrap="square" lIns="215289" tIns="0" rIns="215289" bIns="0" numCol="1" spcCol="1270" anchor="ctr" anchorCtr="0">
+          <a:noAutofit/>
+        </a:bodyPr>
+        <a:lstStyle/>
+        <a:p>
+          <a:pPr lvl="0" algn="l" defTabSz="889000">
+            <a:lnSpc>
+              <a:spcPct val="90000"/>
+            </a:lnSpc>
+            <a:spcBef>
+              <a:spcPct val="0"/>
+            </a:spcBef>
+            <a:spcAft>
+              <a:spcPct val="35000"/>
+            </a:spcAft>
+          </a:pPr>
+          <a:r>
+            <a:rPr lang="es-PE" sz="2000" b="1" kern="1200" dirty="0" smtClean="0"/>
+            <a:t>Objetivo Específico </a:t>
+          </a:r>
+          <a:r>
+            <a:rPr lang="es-PE" sz="2000" b="1" kern="1200" dirty="0" smtClean="0"/>
+            <a:t>2 [OE2]</a:t>
+          </a:r>
+          <a:endParaRPr lang="es-PE" sz="2000" b="1" kern="1200" dirty="0"/>
+        </a:p>
+      </dsp:txBody>
+      <dsp:txXfrm>
+        <a:off x="435666" y="1220567"/>
+        <a:ext cx="5638190" cy="532758"/>
+      </dsp:txXfrm>
+    </dsp:sp>
+    <dsp:sp modelId="{FC04ED5C-48CE-49A3-98DF-4CA3B004B014}">
+      <dsp:nvSpPr>
+        <dsp:cNvPr id="0" name=""/>
+        <dsp:cNvSpPr/>
+      </dsp:nvSpPr>
+      <dsp:spPr>
+        <a:xfrm>
+          <a:off x="0" y="2850896"/>
           <a:ext cx="8136904" cy="2016000"/>
         </a:xfrm>
         <a:prstGeom prst="rect">
@@ -6382,28 +6536,24 @@
           </a:r>
           <a:r>
             <a:rPr lang="es-ES" sz="1600" kern="1200" dirty="0" smtClean="0"/>
-            <a:t>Cierre y retroalimentación (</a:t>
-          </a:r>
-          <a:r>
-            <a:rPr lang="es-ES" sz="1600" kern="1200" smtClean="0"/>
-            <a:t>post-servicio)</a:t>
+            <a:t>Cierre y retroalimentación (post-servicio)</a:t>
           </a:r>
           <a:endParaRPr lang="es-PE" sz="1600" kern="1200" dirty="0"/>
         </a:p>
       </dsp:txBody>
       <dsp:txXfrm>
-        <a:off x="0" y="1486946"/>
+        <a:off x="0" y="2850896"/>
         <a:ext cx="8136904" cy="2016000"/>
       </dsp:txXfrm>
     </dsp:sp>
-    <dsp:sp modelId="{501DDC76-9B9F-4697-8027-10EB121BC8A9}">
+    <dsp:sp modelId="{E74DBF66-3AE1-4F14-A029-A5F2D0C36F78}">
       <dsp:nvSpPr>
         <dsp:cNvPr id="0" name=""/>
         <dsp:cNvSpPr/>
       </dsp:nvSpPr>
       <dsp:spPr>
         <a:xfrm>
-          <a:off x="406845" y="1191746"/>
+          <a:off x="406845" y="2555696"/>
           <a:ext cx="5695832" cy="590400"/>
         </a:xfrm>
         <a:prstGeom prst="roundRect">
@@ -6463,167 +6613,25 @@
           </a:pPr>
           <a:r>
             <a:rPr lang="es-PE" sz="2000" b="1" kern="1200" dirty="0" smtClean="0"/>
-            <a:t>Objetivo Específico 2 [OE2]</a:t>
+            <a:t>Objetivo Específico </a:t>
+          </a:r>
+          <a:r>
+            <a:rPr lang="es-PE" sz="2000" b="1" kern="1200" dirty="0" smtClean="0"/>
+            <a:t>3 </a:t>
+          </a:r>
+          <a:r>
+            <a:rPr lang="es-PE" sz="2000" b="1" kern="1200" dirty="0" smtClean="0"/>
+            <a:t>[</a:t>
+          </a:r>
+          <a:r>
+            <a:rPr lang="es-PE" sz="2000" b="1" kern="1200" dirty="0" smtClean="0"/>
+            <a:t>OE3]</a:t>
           </a:r>
           <a:endParaRPr lang="es-PE" sz="2000" b="1" kern="1200" dirty="0"/>
         </a:p>
       </dsp:txBody>
       <dsp:txXfrm>
-        <a:off x="435666" y="1220567"/>
-        <a:ext cx="5638190" cy="532758"/>
-      </dsp:txXfrm>
-    </dsp:sp>
-    <dsp:sp modelId="{FC04ED5C-48CE-49A3-98DF-4CA3B004B014}">
-      <dsp:nvSpPr>
-        <dsp:cNvPr id="0" name=""/>
-        <dsp:cNvSpPr/>
-      </dsp:nvSpPr>
-      <dsp:spPr>
-        <a:xfrm>
-          <a:off x="0" y="3906146"/>
-          <a:ext cx="8136904" cy="960750"/>
-        </a:xfrm>
-        <a:prstGeom prst="rect">
-          <a:avLst/>
-        </a:prstGeom>
-        <a:solidFill>
-          <a:schemeClr val="lt1">
-            <a:alpha val="90000"/>
-            <a:hueOff val="0"/>
-            <a:satOff val="0"/>
-            <a:lumOff val="0"/>
-            <a:alphaOff val="0"/>
-          </a:schemeClr>
-        </a:solidFill>
-        <a:ln w="25400" cap="flat" cmpd="sng" algn="ctr">
-          <a:solidFill>
-            <a:schemeClr val="accent6">
-              <a:hueOff val="0"/>
-              <a:satOff val="0"/>
-              <a:lumOff val="0"/>
-              <a:alphaOff val="0"/>
-            </a:schemeClr>
-          </a:solidFill>
-          <a:prstDash val="solid"/>
-        </a:ln>
-        <a:effectLst/>
-      </dsp:spPr>
-      <dsp:style>
-        <a:lnRef idx="2">
-          <a:scrgbClr r="0" g="0" b="0"/>
-        </a:lnRef>
-        <a:fillRef idx="1">
-          <a:scrgbClr r="0" g="0" b="0"/>
-        </a:fillRef>
-        <a:effectRef idx="0">
-          <a:scrgbClr r="0" g="0" b="0"/>
-        </a:effectRef>
-        <a:fontRef idx="minor"/>
-      </dsp:style>
-      <dsp:txBody>
-        <a:bodyPr spcFirstLastPara="0" vert="horz" wrap="square" lIns="631514" tIns="416560" rIns="631514" bIns="113792" numCol="1" spcCol="1270" anchor="t" anchorCtr="0">
-          <a:noAutofit/>
-        </a:bodyPr>
-        <a:lstStyle/>
-        <a:p>
-          <a:pPr marL="171450" lvl="1" indent="-171450" algn="l" defTabSz="711200">
-            <a:lnSpc>
-              <a:spcPct val="90000"/>
-            </a:lnSpc>
-            <a:spcBef>
-              <a:spcPct val="0"/>
-            </a:spcBef>
-            <a:spcAft>
-              <a:spcPct val="15000"/>
-            </a:spcAft>
-            <a:buChar char="••"/>
-          </a:pPr>
-          <a:r>
-            <a:rPr lang="es-ES" sz="1600" kern="1200" dirty="0" smtClean="0"/>
-            <a:t>Definir las reglas y políticas de negocio que deben cumplir todos los actores involucrados.</a:t>
-          </a:r>
-          <a:endParaRPr lang="es-PE" sz="1600" kern="1200" dirty="0"/>
-        </a:p>
-      </dsp:txBody>
-      <dsp:txXfrm>
-        <a:off x="0" y="3906146"/>
-        <a:ext cx="8136904" cy="960750"/>
-      </dsp:txXfrm>
-    </dsp:sp>
-    <dsp:sp modelId="{E74DBF66-3AE1-4F14-A029-A5F2D0C36F78}">
-      <dsp:nvSpPr>
-        <dsp:cNvPr id="0" name=""/>
-        <dsp:cNvSpPr/>
-      </dsp:nvSpPr>
-      <dsp:spPr>
-        <a:xfrm>
-          <a:off x="406845" y="3610946"/>
-          <a:ext cx="5695832" cy="590400"/>
-        </a:xfrm>
-        <a:prstGeom prst="roundRect">
-          <a:avLst/>
-        </a:prstGeom>
-        <a:solidFill>
-          <a:schemeClr val="accent6">
-            <a:hueOff val="0"/>
-            <a:satOff val="0"/>
-            <a:lumOff val="0"/>
-            <a:alphaOff val="0"/>
-          </a:schemeClr>
-        </a:solidFill>
-        <a:ln w="25400" cap="flat" cmpd="sng" algn="ctr">
-          <a:solidFill>
-            <a:schemeClr val="lt1">
-              <a:hueOff val="0"/>
-              <a:satOff val="0"/>
-              <a:lumOff val="0"/>
-              <a:alphaOff val="0"/>
-            </a:schemeClr>
-          </a:solidFill>
-          <a:prstDash val="solid"/>
-        </a:ln>
-        <a:effectLst/>
-      </dsp:spPr>
-      <dsp:style>
-        <a:lnRef idx="2">
-          <a:scrgbClr r="0" g="0" b="0"/>
-        </a:lnRef>
-        <a:fillRef idx="1">
-          <a:scrgbClr r="0" g="0" b="0"/>
-        </a:fillRef>
-        <a:effectRef idx="0">
-          <a:scrgbClr r="0" g="0" b="0"/>
-        </a:effectRef>
-        <a:fontRef idx="minor">
-          <a:schemeClr val="lt1"/>
-        </a:fontRef>
-      </dsp:style>
-      <dsp:txBody>
-        <a:bodyPr spcFirstLastPara="0" vert="horz" wrap="square" lIns="215289" tIns="0" rIns="215289" bIns="0" numCol="1" spcCol="1270" anchor="ctr" anchorCtr="0">
-          <a:noAutofit/>
-        </a:bodyPr>
-        <a:lstStyle/>
-        <a:p>
-          <a:pPr lvl="0" algn="l" defTabSz="889000">
-            <a:lnSpc>
-              <a:spcPct val="90000"/>
-            </a:lnSpc>
-            <a:spcBef>
-              <a:spcPct val="0"/>
-            </a:spcBef>
-            <a:spcAft>
-              <a:spcPct val="35000"/>
-            </a:spcAft>
-          </a:pPr>
-          <a:r>
-            <a:rPr lang="es-PE" sz="2000" b="1" kern="1200" dirty="0" smtClean="0"/>
-            <a:t>Objetivo Específico 3 [OE3]</a:t>
-          </a:r>
-          <a:endParaRPr lang="es-PE" sz="2000" b="1" kern="1200" dirty="0"/>
-        </a:p>
-      </dsp:txBody>
-      <dsp:txXfrm>
-        <a:off x="435666" y="3639767"/>
+        <a:off x="435666" y="2584517"/>
         <a:ext cx="5638190" cy="532758"/>
       </dsp:txXfrm>
     </dsp:sp>
@@ -6706,15 +6714,7 @@
           </a:pPr>
           <a:r>
             <a:rPr lang="es-ES" sz="1600" kern="1200" dirty="0" smtClean="0"/>
-            <a:t>Implementar un proceso de búsqueda para la asignación automática </a:t>
-          </a:r>
-          <a:r>
-            <a:rPr lang="es-ES" sz="1600" kern="1200" dirty="0" smtClean="0"/>
-            <a:t>de los mejores proveedores </a:t>
-          </a:r>
-          <a:r>
-            <a:rPr lang="es-ES" sz="1600" kern="1200" dirty="0" smtClean="0"/>
-            <a:t>al cliente basada en el algoritmo Tabú </a:t>
+            <a:t>Implementar un proceso de búsqueda para la asignación automática de los mejores proveedores al cliente basada en el algoritmo Tabú </a:t>
           </a:r>
           <a:r>
             <a:rPr lang="es-MX" sz="1600" kern="1200" dirty="0" smtClean="0"/>
@@ -7181,8 +7181,8 @@
       </dsp:nvSpPr>
       <dsp:spPr>
         <a:xfrm rot="5400000">
-          <a:off x="4204325" y="-3086820"/>
-          <a:ext cx="616216" cy="6945553"/>
+          <a:off x="4187343" y="-3065486"/>
+          <a:ext cx="650181" cy="6945553"/>
         </a:xfrm>
         <a:prstGeom prst="round2SameRect">
           <a:avLst/>
@@ -7250,8 +7250,8 @@
         </a:p>
       </dsp:txBody>
       <dsp:txXfrm rot="-5400000">
-        <a:off x="1039657" y="107929"/>
-        <a:ext cx="6915472" cy="556054"/>
+        <a:off x="1039658" y="113938"/>
+        <a:ext cx="6913814" cy="586703"/>
       </dsp:txXfrm>
     </dsp:sp>
     <dsp:sp modelId="{A06528E6-100A-4976-B138-5E903706F02B}">
@@ -7261,8 +7261,8 @@
       </dsp:nvSpPr>
       <dsp:spPr>
         <a:xfrm>
-          <a:off x="220443" y="820"/>
-          <a:ext cx="819213" cy="770271"/>
+          <a:off x="220443" y="926"/>
+          <a:ext cx="819213" cy="812727"/>
         </a:xfrm>
         <a:prstGeom prst="roundRect">
           <a:avLst/>
@@ -7328,8 +7328,8 @@
         </a:p>
       </dsp:txBody>
       <dsp:txXfrm>
-        <a:off x="258045" y="38422"/>
-        <a:ext cx="744009" cy="695067"/>
+        <a:off x="260117" y="40600"/>
+        <a:ext cx="739865" cy="733379"/>
       </dsp:txXfrm>
     </dsp:sp>
     <dsp:sp modelId="{123E87A1-D0D6-46FD-AD18-592C1BD4BACE}">
@@ -7339,166 +7339,8 @@
       </dsp:nvSpPr>
       <dsp:spPr>
         <a:xfrm rot="5400000">
-          <a:off x="4202513" y="-2276223"/>
-          <a:ext cx="616216" cy="6941928"/>
-        </a:xfrm>
-        <a:prstGeom prst="round2SameRect">
-          <a:avLst/>
-        </a:prstGeom>
-        <a:solidFill>
-          <a:schemeClr val="accent6">
-            <a:alpha val="90000"/>
-            <a:tint val="40000"/>
-            <a:hueOff val="0"/>
-            <a:satOff val="0"/>
-            <a:lumOff val="0"/>
-            <a:alphaOff val="0"/>
-          </a:schemeClr>
-        </a:solidFill>
-        <a:ln w="25400" cap="flat" cmpd="sng" algn="ctr">
-          <a:solidFill>
-            <a:schemeClr val="accent6">
-              <a:alpha val="90000"/>
-              <a:tint val="40000"/>
-              <a:hueOff val="0"/>
-              <a:satOff val="0"/>
-              <a:lumOff val="0"/>
-              <a:alphaOff val="0"/>
-            </a:schemeClr>
-          </a:solidFill>
-          <a:prstDash val="solid"/>
-        </a:ln>
-        <a:effectLst/>
-      </dsp:spPr>
-      <dsp:style>
-        <a:lnRef idx="2">
-          <a:scrgbClr r="0" g="0" b="0"/>
-        </a:lnRef>
-        <a:fillRef idx="1">
-          <a:scrgbClr r="0" g="0" b="0"/>
-        </a:fillRef>
-        <a:effectRef idx="0">
-          <a:scrgbClr r="0" g="0" b="0"/>
-        </a:effectRef>
-        <a:fontRef idx="minor"/>
-      </dsp:style>
-      <dsp:txBody>
-        <a:bodyPr spcFirstLastPara="0" vert="horz" wrap="square" lIns="247650" tIns="123825" rIns="247650" bIns="123825" numCol="1" spcCol="1270" anchor="ctr" anchorCtr="0">
-          <a:noAutofit/>
-        </a:bodyPr>
-        <a:lstStyle/>
-        <a:p>
-          <a:pPr marL="114300" lvl="1" indent="-114300" algn="l" defTabSz="622300">
-            <a:lnSpc>
-              <a:spcPct val="90000"/>
-            </a:lnSpc>
-            <a:spcBef>
-              <a:spcPct val="0"/>
-            </a:spcBef>
-            <a:spcAft>
-              <a:spcPct val="15000"/>
-            </a:spcAft>
-            <a:buChar char="••"/>
-          </a:pPr>
-          <a:r>
-            <a:rPr lang="es-PE" sz="1400" kern="1200" dirty="0" smtClean="0"/>
-            <a:t>Documento que contiene los diagramas de procesos de negocio mencionados en el objetivo específico 2.</a:t>
-          </a:r>
-          <a:endParaRPr lang="es-PE" sz="1400" kern="1200" dirty="0"/>
-        </a:p>
-      </dsp:txBody>
-      <dsp:txXfrm rot="-5400000">
-        <a:off x="1039658" y="916713"/>
-        <a:ext cx="6911847" cy="556054"/>
-      </dsp:txXfrm>
-    </dsp:sp>
-    <dsp:sp modelId="{A075BA52-9E9E-49BC-B10D-54726DBFECBB}">
-      <dsp:nvSpPr>
-        <dsp:cNvPr id="0" name=""/>
-        <dsp:cNvSpPr/>
-      </dsp:nvSpPr>
-      <dsp:spPr>
-        <a:xfrm>
-          <a:off x="220443" y="809605"/>
-          <a:ext cx="819213" cy="770271"/>
-        </a:xfrm>
-        <a:prstGeom prst="roundRect">
-          <a:avLst/>
-        </a:prstGeom>
-        <a:solidFill>
-          <a:schemeClr val="accent6">
-            <a:alpha val="90000"/>
-            <a:hueOff val="0"/>
-            <a:satOff val="0"/>
-            <a:lumOff val="0"/>
-            <a:alphaOff val="-8000"/>
-          </a:schemeClr>
-        </a:solidFill>
-        <a:ln w="25400" cap="flat" cmpd="sng" algn="ctr">
-          <a:solidFill>
-            <a:schemeClr val="lt1">
-              <a:hueOff val="0"/>
-              <a:satOff val="0"/>
-              <a:lumOff val="0"/>
-              <a:alphaOff val="0"/>
-            </a:schemeClr>
-          </a:solidFill>
-          <a:prstDash val="solid"/>
-        </a:ln>
-        <a:effectLst/>
-      </dsp:spPr>
-      <dsp:style>
-        <a:lnRef idx="2">
-          <a:scrgbClr r="0" g="0" b="0"/>
-        </a:lnRef>
-        <a:fillRef idx="1">
-          <a:scrgbClr r="0" g="0" b="0"/>
-        </a:fillRef>
-        <a:effectRef idx="0">
-          <a:scrgbClr r="0" g="0" b="0"/>
-        </a:effectRef>
-        <a:fontRef idx="minor">
-          <a:schemeClr val="lt1"/>
-        </a:fontRef>
-      </dsp:style>
-      <dsp:txBody>
-        <a:bodyPr spcFirstLastPara="0" vert="horz" wrap="square" lIns="53340" tIns="26670" rIns="53340" bIns="26670" numCol="1" spcCol="1270" anchor="ctr" anchorCtr="0">
-          <a:noAutofit/>
-        </a:bodyPr>
-        <a:lstStyle/>
-        <a:p>
-          <a:pPr lvl="0" algn="ctr" defTabSz="622300">
-            <a:lnSpc>
-              <a:spcPct val="90000"/>
-            </a:lnSpc>
-            <a:spcBef>
-              <a:spcPct val="0"/>
-            </a:spcBef>
-            <a:spcAft>
-              <a:spcPct val="35000"/>
-            </a:spcAft>
-          </a:pPr>
-          <a:r>
-            <a:rPr lang="es-PE" sz="1400" b="1" kern="1200" dirty="0" smtClean="0"/>
-            <a:t>RE2 para OE2</a:t>
-          </a:r>
-          <a:endParaRPr lang="es-PE" sz="1400" kern="1200" dirty="0"/>
-        </a:p>
-      </dsp:txBody>
-      <dsp:txXfrm>
-        <a:off x="258045" y="847207"/>
-        <a:ext cx="744009" cy="695067"/>
-      </dsp:txXfrm>
-    </dsp:sp>
-    <dsp:sp modelId="{AFC1D999-AB59-46E9-9D86-EC2926324F27}">
-      <dsp:nvSpPr>
-        <dsp:cNvPr id="0" name=""/>
-        <dsp:cNvSpPr/>
-      </dsp:nvSpPr>
-      <dsp:spPr>
-        <a:xfrm rot="5400000">
-          <a:off x="4042011" y="-1319145"/>
-          <a:ext cx="872975" cy="6861512"/>
+          <a:off x="4149003" y="-2210310"/>
+          <a:ext cx="723236" cy="6941928"/>
         </a:xfrm>
         <a:prstGeom prst="round2SameRect">
           <a:avLst/>
@@ -7574,8 +7416,166 @@
         </a:p>
       </dsp:txBody>
       <dsp:txXfrm rot="-5400000">
-        <a:off x="1047743" y="1717738"/>
-        <a:ext cx="6818897" cy="787745"/>
+        <a:off x="1039658" y="934340"/>
+        <a:ext cx="6906623" cy="652626"/>
+      </dsp:txXfrm>
+    </dsp:sp>
+    <dsp:sp modelId="{A075BA52-9E9E-49BC-B10D-54726DBFECBB}">
+      <dsp:nvSpPr>
+        <dsp:cNvPr id="0" name=""/>
+        <dsp:cNvSpPr/>
+      </dsp:nvSpPr>
+      <dsp:spPr>
+        <a:xfrm>
+          <a:off x="220443" y="854290"/>
+          <a:ext cx="819213" cy="812727"/>
+        </a:xfrm>
+        <a:prstGeom prst="roundRect">
+          <a:avLst/>
+        </a:prstGeom>
+        <a:solidFill>
+          <a:schemeClr val="accent6">
+            <a:alpha val="90000"/>
+            <a:hueOff val="0"/>
+            <a:satOff val="0"/>
+            <a:lumOff val="0"/>
+            <a:alphaOff val="-8000"/>
+          </a:schemeClr>
+        </a:solidFill>
+        <a:ln w="25400" cap="flat" cmpd="sng" algn="ctr">
+          <a:solidFill>
+            <a:schemeClr val="lt1">
+              <a:hueOff val="0"/>
+              <a:satOff val="0"/>
+              <a:lumOff val="0"/>
+              <a:alphaOff val="0"/>
+            </a:schemeClr>
+          </a:solidFill>
+          <a:prstDash val="solid"/>
+        </a:ln>
+        <a:effectLst/>
+      </dsp:spPr>
+      <dsp:style>
+        <a:lnRef idx="2">
+          <a:scrgbClr r="0" g="0" b="0"/>
+        </a:lnRef>
+        <a:fillRef idx="1">
+          <a:scrgbClr r="0" g="0" b="0"/>
+        </a:fillRef>
+        <a:effectRef idx="0">
+          <a:scrgbClr r="0" g="0" b="0"/>
+        </a:effectRef>
+        <a:fontRef idx="minor">
+          <a:schemeClr val="lt1"/>
+        </a:fontRef>
+      </dsp:style>
+      <dsp:txBody>
+        <a:bodyPr spcFirstLastPara="0" vert="horz" wrap="square" lIns="53340" tIns="26670" rIns="53340" bIns="26670" numCol="1" spcCol="1270" anchor="ctr" anchorCtr="0">
+          <a:noAutofit/>
+        </a:bodyPr>
+        <a:lstStyle/>
+        <a:p>
+          <a:pPr lvl="0" algn="ctr" defTabSz="622300">
+            <a:lnSpc>
+              <a:spcPct val="90000"/>
+            </a:lnSpc>
+            <a:spcBef>
+              <a:spcPct val="0"/>
+            </a:spcBef>
+            <a:spcAft>
+              <a:spcPct val="35000"/>
+            </a:spcAft>
+          </a:pPr>
+          <a:r>
+            <a:rPr lang="es-PE" sz="1400" b="1" kern="1200" dirty="0" smtClean="0"/>
+            <a:t>RE2 para OE2</a:t>
+          </a:r>
+          <a:endParaRPr lang="es-PE" sz="1400" kern="1200" dirty="0"/>
+        </a:p>
+      </dsp:txBody>
+      <dsp:txXfrm>
+        <a:off x="260117" y="893964"/>
+        <a:ext cx="739865" cy="733379"/>
+      </dsp:txXfrm>
+    </dsp:sp>
+    <dsp:sp modelId="{AFC1D999-AB59-46E9-9D86-EC2926324F27}">
+      <dsp:nvSpPr>
+        <dsp:cNvPr id="0" name=""/>
+        <dsp:cNvSpPr/>
+      </dsp:nvSpPr>
+      <dsp:spPr>
+        <a:xfrm rot="5400000">
+          <a:off x="4154086" y="-1343039"/>
+          <a:ext cx="657151" cy="6868219"/>
+        </a:xfrm>
+        <a:prstGeom prst="round2SameRect">
+          <a:avLst/>
+        </a:prstGeom>
+        <a:solidFill>
+          <a:schemeClr val="accent6">
+            <a:alpha val="90000"/>
+            <a:tint val="40000"/>
+            <a:hueOff val="0"/>
+            <a:satOff val="0"/>
+            <a:lumOff val="0"/>
+            <a:alphaOff val="0"/>
+          </a:schemeClr>
+        </a:solidFill>
+        <a:ln w="25400" cap="flat" cmpd="sng" algn="ctr">
+          <a:solidFill>
+            <a:schemeClr val="accent6">
+              <a:alpha val="90000"/>
+              <a:tint val="40000"/>
+              <a:hueOff val="0"/>
+              <a:satOff val="0"/>
+              <a:lumOff val="0"/>
+              <a:alphaOff val="0"/>
+            </a:schemeClr>
+          </a:solidFill>
+          <a:prstDash val="solid"/>
+        </a:ln>
+        <a:effectLst/>
+      </dsp:spPr>
+      <dsp:style>
+        <a:lnRef idx="2">
+          <a:scrgbClr r="0" g="0" b="0"/>
+        </a:lnRef>
+        <a:fillRef idx="1">
+          <a:scrgbClr r="0" g="0" b="0"/>
+        </a:fillRef>
+        <a:effectRef idx="0">
+          <a:scrgbClr r="0" g="0" b="0"/>
+        </a:effectRef>
+        <a:fontRef idx="minor"/>
+      </dsp:style>
+      <dsp:txBody>
+        <a:bodyPr spcFirstLastPara="0" vert="horz" wrap="square" lIns="247650" tIns="123825" rIns="247650" bIns="123825" numCol="1" spcCol="1270" anchor="ctr" anchorCtr="0">
+          <a:noAutofit/>
+        </a:bodyPr>
+        <a:lstStyle/>
+        <a:p>
+          <a:pPr marL="114300" lvl="1" indent="-114300" algn="l" defTabSz="622300">
+            <a:lnSpc>
+              <a:spcPct val="90000"/>
+            </a:lnSpc>
+            <a:spcBef>
+              <a:spcPct val="0"/>
+            </a:spcBef>
+            <a:spcAft>
+              <a:spcPct val="15000"/>
+            </a:spcAft>
+            <a:buChar char="••"/>
+          </a:pPr>
+          <a:r>
+            <a:rPr lang="es-PE" sz="1400" kern="1200" dirty="0" smtClean="0"/>
+            <a:t>Documento que contiene los diagramas de procesos de negocio mencionados en el objetivo específico 3.</a:t>
+          </a:r>
+          <a:endParaRPr lang="es-PE" sz="1400" kern="1200" dirty="0"/>
+        </a:p>
+      </dsp:txBody>
+      <dsp:txXfrm rot="-5400000">
+        <a:off x="1048553" y="1794573"/>
+        <a:ext cx="6836140" cy="592993"/>
       </dsp:txXfrm>
     </dsp:sp>
     <dsp:sp modelId="{B3F5683C-6936-44A0-9206-6A2FB0D41DEA}">
@@ -7585,8 +7585,8 @@
       </dsp:nvSpPr>
       <dsp:spPr>
         <a:xfrm>
-          <a:off x="220443" y="1618390"/>
-          <a:ext cx="827299" cy="986440"/>
+          <a:off x="220443" y="1707653"/>
+          <a:ext cx="828108" cy="766832"/>
         </a:xfrm>
         <a:prstGeom prst="roundRect">
           <a:avLst/>
@@ -7652,8 +7652,8 @@
         </a:p>
       </dsp:txBody>
       <dsp:txXfrm>
-        <a:off x="260828" y="1658775"/>
-        <a:ext cx="746529" cy="905670"/>
+        <a:off x="257877" y="1745087"/>
+        <a:ext cx="753240" cy="691964"/>
       </dsp:txXfrm>
     </dsp:sp>
     <dsp:sp modelId="{E6AA9730-C1F3-4EA4-B4B8-FC8BA901A561}">
@@ -7663,8 +7663,8 @@
       </dsp:nvSpPr>
       <dsp:spPr>
         <a:xfrm rot="5400000">
-          <a:off x="4108959" y="-390106"/>
-          <a:ext cx="794944" cy="6935149"/>
+          <a:off x="4087051" y="-494399"/>
+          <a:ext cx="838760" cy="6935149"/>
         </a:xfrm>
         <a:prstGeom prst="round2SameRect">
           <a:avLst/>
@@ -7726,22 +7726,14 @@
           </a:pPr>
           <a:r>
             <a:rPr lang="es-PE" sz="1400" kern="1200" dirty="0" smtClean="0"/>
-            <a:t>Documento que contiene en lenguaje natural y en español el pseudocódigo del algoritmo Tabú para la asignación </a:t>
-          </a:r>
-          <a:r>
-            <a:rPr lang="es-PE" sz="1400" kern="1200" dirty="0" smtClean="0"/>
-            <a:t>de los mejores proveedores </a:t>
-          </a:r>
-          <a:r>
-            <a:rPr lang="es-PE" sz="1400" kern="1200" dirty="0" smtClean="0"/>
-            <a:t>al cliente, dados los factores mencionados en el objetivo específico 4.</a:t>
+            <a:t>Documento que contiene en lenguaje natural y en español el pseudocódigo del algoritmo Tabú para la asignación de los mejores proveedores al cliente, dados los factores mencionados en el objetivo específico 4.</a:t>
           </a:r>
           <a:endParaRPr lang="es-PE" sz="1400" kern="1200" dirty="0"/>
         </a:p>
       </dsp:txBody>
       <dsp:txXfrm rot="-5400000">
-        <a:off x="1038857" y="2718802"/>
-        <a:ext cx="6896343" cy="717332"/>
+        <a:off x="1038857" y="2594740"/>
+        <a:ext cx="6894204" cy="756870"/>
       </dsp:txXfrm>
     </dsp:sp>
     <dsp:sp modelId="{5D93FB81-256D-417C-9473-A7133EA5EFFF}">
@@ -7751,8 +7743,8 @@
       </dsp:nvSpPr>
       <dsp:spPr>
         <a:xfrm>
-          <a:off x="220443" y="2696574"/>
-          <a:ext cx="818413" cy="763600"/>
+          <a:off x="220443" y="2571286"/>
+          <a:ext cx="818413" cy="805688"/>
         </a:xfrm>
         <a:prstGeom prst="roundRect">
           <a:avLst/>
@@ -7818,8 +7810,8 @@
         </a:p>
       </dsp:txBody>
       <dsp:txXfrm>
-        <a:off x="257719" y="2733850"/>
-        <a:ext cx="743861" cy="689048"/>
+        <a:off x="259773" y="2610616"/>
+        <a:ext cx="739753" cy="727028"/>
       </dsp:txXfrm>
     </dsp:sp>
     <dsp:sp modelId="{FB62193B-2F1D-4A91-B26C-671F94C83B03}">
@@ -7829,8 +7821,8 @@
       </dsp:nvSpPr>
       <dsp:spPr>
         <a:xfrm rot="5400000">
-          <a:off x="4181314" y="458745"/>
-          <a:ext cx="616216" cy="6899531"/>
+          <a:off x="4164331" y="400257"/>
+          <a:ext cx="650181" cy="6899531"/>
         </a:xfrm>
         <a:prstGeom prst="round2SameRect">
           <a:avLst/>
@@ -7898,8 +7890,8 @@
         </a:p>
       </dsp:txBody>
       <dsp:txXfrm rot="-5400000">
-        <a:off x="1039657" y="3630484"/>
-        <a:ext cx="6869450" cy="556054"/>
+        <a:off x="1039657" y="3556671"/>
+        <a:ext cx="6867792" cy="586703"/>
       </dsp:txXfrm>
     </dsp:sp>
     <dsp:sp modelId="{8A58B697-73FE-43B7-BCEA-3226F7839FCE}">
@@ -7909,8 +7901,8 @@
       </dsp:nvSpPr>
       <dsp:spPr>
         <a:xfrm>
-          <a:off x="220443" y="3478203"/>
-          <a:ext cx="819213" cy="770271"/>
+          <a:off x="220443" y="3395998"/>
+          <a:ext cx="819213" cy="812727"/>
         </a:xfrm>
         <a:prstGeom prst="roundRect">
           <a:avLst/>
@@ -7976,8 +7968,8 @@
         </a:p>
       </dsp:txBody>
       <dsp:txXfrm>
-        <a:off x="258045" y="3515805"/>
-        <a:ext cx="744009" cy="695067"/>
+        <a:off x="260117" y="3435672"/>
+        <a:ext cx="739865" cy="733379"/>
       </dsp:txXfrm>
     </dsp:sp>
     <dsp:sp modelId="{453FC30B-1580-48DA-9784-2477E53F72C0}">
@@ -7987,8 +7979,8 @@
       </dsp:nvSpPr>
       <dsp:spPr>
         <a:xfrm rot="5400000">
-          <a:off x="4205954" y="1152253"/>
-          <a:ext cx="616216" cy="6948811"/>
+          <a:off x="4188971" y="1133348"/>
+          <a:ext cx="650181" cy="6948811"/>
         </a:xfrm>
         <a:prstGeom prst="round2SameRect">
           <a:avLst/>
@@ -8056,8 +8048,8 @@
         </a:p>
       </dsp:txBody>
       <dsp:txXfrm rot="-5400000">
-        <a:off x="1039657" y="4348632"/>
-        <a:ext cx="6918730" cy="556054"/>
+        <a:off x="1039657" y="4314402"/>
+        <a:ext cx="6917072" cy="586703"/>
       </dsp:txXfrm>
     </dsp:sp>
     <dsp:sp modelId="{05F5B675-A481-4090-9BE1-378A47821575}">
@@ -8067,8 +8059,8 @@
       </dsp:nvSpPr>
       <dsp:spPr>
         <a:xfrm>
-          <a:off x="220443" y="4285586"/>
-          <a:ext cx="819213" cy="682144"/>
+          <a:off x="220443" y="4247882"/>
+          <a:ext cx="819213" cy="719742"/>
         </a:xfrm>
         <a:prstGeom prst="roundRect">
           <a:avLst/>
@@ -8134,8 +8126,8 @@
         </a:p>
       </dsp:txBody>
       <dsp:txXfrm>
-        <a:off x="253743" y="4318886"/>
-        <a:ext cx="752613" cy="615544"/>
+        <a:off x="255578" y="4283017"/>
+        <a:ext cx="748943" cy="649472"/>
       </dsp:txXfrm>
     </dsp:sp>
   </dsp:spTree>
@@ -18474,7 +18466,7 @@
               <a:pPr>
                 <a:defRPr/>
               </a:pPr>
-              <a:t>30/09/2013</a:t>
+              <a:t>11/10/2013</a:t>
             </a:fld>
             <a:endParaRPr lang="es-PE"/>
           </a:p>
@@ -18672,7 +18664,7 @@
               <a:pPr>
                 <a:defRPr/>
               </a:pPr>
-              <a:t>30/09/2013</a:t>
+              <a:t>11/10/2013</a:t>
             </a:fld>
             <a:endParaRPr lang="es-PE"/>
           </a:p>
@@ -18879,7 +18871,7 @@
               <a:pPr>
                 <a:defRPr/>
               </a:pPr>
-              <a:t>30/09/2013</a:t>
+              <a:t>11/10/2013</a:t>
             </a:fld>
             <a:endParaRPr lang="es-PE"/>
           </a:p>
@@ -20324,7 +20316,7 @@
               <a:pPr>
                 <a:defRPr/>
               </a:pPr>
-              <a:t>30/09/2013</a:t>
+              <a:t>11/10/2013</a:t>
             </a:fld>
             <a:endParaRPr lang="es-PE"/>
           </a:p>
@@ -22559,7 +22551,7 @@
               <a:pPr>
                 <a:defRPr/>
               </a:pPr>
-              <a:t>30/09/2013</a:t>
+              <a:t>11/10/2013</a:t>
             </a:fld>
             <a:endParaRPr lang="es-PE"/>
           </a:p>
@@ -24798,7 +24790,7 @@
               <a:pPr>
                 <a:defRPr/>
               </a:pPr>
-              <a:t>30/09/2013</a:t>
+              <a:t>11/10/2013</a:t>
             </a:fld>
             <a:endParaRPr lang="es-PE"/>
           </a:p>
@@ -26867,7 +26859,7 @@
               <a:pPr>
                 <a:defRPr/>
               </a:pPr>
-              <a:t>30/09/2013</a:t>
+              <a:t>11/10/2013</a:t>
             </a:fld>
             <a:endParaRPr lang="es-PE"/>
           </a:p>
@@ -28407,7 +28399,7 @@
               <a:pPr>
                 <a:defRPr/>
               </a:pPr>
-              <a:t>30/09/2013</a:t>
+              <a:t>11/10/2013</a:t>
             </a:fld>
             <a:endParaRPr lang="es-PE"/>
           </a:p>
@@ -28529,7 +28521,7 @@
               <a:pPr>
                 <a:defRPr/>
               </a:pPr>
-              <a:t>30/09/2013</a:t>
+              <a:t>11/10/2013</a:t>
             </a:fld>
             <a:endParaRPr lang="es-PE"/>
           </a:p>
@@ -28833,7 +28825,7 @@
               <a:pPr>
                 <a:defRPr/>
               </a:pPr>
-              <a:t>30/09/2013</a:t>
+              <a:t>11/10/2013</a:t>
             </a:fld>
             <a:endParaRPr lang="es-PE"/>
           </a:p>
@@ -29116,7 +29108,7 @@
               <a:pPr>
                 <a:defRPr/>
               </a:pPr>
-              <a:t>30/09/2013</a:t>
+              <a:t>11/10/2013</a:t>
             </a:fld>
             <a:endParaRPr lang="es-PE"/>
           </a:p>
@@ -29403,7 +29395,7 @@
               <a:pPr>
                 <a:defRPr/>
               </a:pPr>
-              <a:t>30/09/2013</a:t>
+              <a:t>11/10/2013</a:t>
             </a:fld>
             <a:endParaRPr lang="es-PE"/>
           </a:p>
@@ -38557,23 +38549,7 @@
                   <a:srgbClr val="000000"/>
                 </a:solidFill>
               </a:rPr>
-              <a:t>Mapeo de </a:t>
-            </a:r>
-            <a:r>
-              <a:rPr lang="es-MX" sz="2400" dirty="0" smtClean="0">
-                <a:solidFill>
-                  <a:srgbClr val="000000"/>
-                </a:solidFill>
-              </a:rPr>
-              <a:t>11 </a:t>
-            </a:r>
-            <a:r>
-              <a:rPr lang="es-MX" sz="2400" dirty="0" smtClean="0">
-                <a:solidFill>
-                  <a:srgbClr val="000000"/>
-                </a:solidFill>
-              </a:rPr>
-              <a:t>clases/tablas – levantamiento de base de datos</a:t>
+              <a:t>Mapeo de 11 clases/tablas – levantamiento de base de datos</a:t>
             </a:r>
           </a:p>
           <a:p>
@@ -38590,15 +38566,7 @@
                   <a:srgbClr val="000000"/>
                 </a:solidFill>
               </a:rPr>
-              <a:t>Registro de proveedores, clientes y </a:t>
-            </a:r>
-            <a:r>
-              <a:rPr lang="es-MX" sz="2400" dirty="0" smtClean="0">
-                <a:solidFill>
-                  <a:srgbClr val="000000"/>
-                </a:solidFill>
-              </a:rPr>
-              <a:t>suministradores</a:t>
+              <a:t>Registro de proveedores, clientes y suministradores</a:t>
             </a:r>
             <a:endParaRPr lang="es-PE" sz="2400" dirty="0" smtClean="0">
               <a:solidFill>
@@ -43702,7 +43670,7 @@
           <p:nvPr>
             <p:extLst>
               <p:ext uri="{D42A27DB-BD31-4B8C-83A1-F6EECF244321}">
-                <p14:modId xmlns:p14="http://schemas.microsoft.com/office/powerpoint/2010/main" val="1531269200"/>
+                <p14:modId xmlns:p14="http://schemas.microsoft.com/office/powerpoint/2010/main" val="2413237663"/>
               </p:ext>
             </p:extLst>
           </p:nvPr>
@@ -44147,7 +44115,7 @@
           <p:nvPr>
             <p:extLst>
               <p:ext uri="{D42A27DB-BD31-4B8C-83A1-F6EECF244321}">
-                <p14:modId xmlns:p14="http://schemas.microsoft.com/office/powerpoint/2010/main" val="4027957902"/>
+                <p14:modId xmlns:p14="http://schemas.microsoft.com/office/powerpoint/2010/main" val="2629592219"/>
               </p:ext>
             </p:extLst>
           </p:nvPr>

</xml_diff>

<commit_message>
DOCUMENTO DE TESIS CON FORMATO - CAP7: ANALISIS COMPARATIVO TECNOLOGIAS
</commit_message>
<xml_diff>
--- a/Documentación/Presentaciones PPT/Tesis 2 - Mendez Presentación.pptx
+++ b/Documentación/Presentaciones PPT/Tesis 2 - Mendez Presentación.pptx
@@ -3926,19 +3926,7 @@
         <a:p>
           <a:r>
             <a:rPr lang="es-PE" sz="2000" b="1" dirty="0" smtClean="0"/>
-            <a:t>Objetivo Específico </a:t>
-          </a:r>
-          <a:r>
-            <a:rPr lang="es-PE" sz="2000" b="1" dirty="0" smtClean="0"/>
-            <a:t>3 </a:t>
-          </a:r>
-          <a:r>
-            <a:rPr lang="es-PE" sz="2000" b="1" dirty="0" smtClean="0"/>
-            <a:t>[</a:t>
-          </a:r>
-          <a:r>
-            <a:rPr lang="es-PE" sz="2000" b="1" dirty="0" smtClean="0"/>
-            <a:t>OE3]</a:t>
+            <a:t>Objetivo Específico 3 [OE3]</a:t>
           </a:r>
           <a:endParaRPr lang="es-PE" sz="2000" b="1" dirty="0"/>
         </a:p>
@@ -4027,11 +4015,7 @@
         <a:p>
           <a:r>
             <a:rPr lang="es-PE" b="1" dirty="0" smtClean="0"/>
-            <a:t>Objetivo Específico </a:t>
-          </a:r>
-          <a:r>
-            <a:rPr lang="es-PE" b="1" dirty="0" smtClean="0"/>
-            <a:t>2 [OE2]</a:t>
+            <a:t>Objetivo Específico 2 [OE2]</a:t>
           </a:r>
           <a:endParaRPr lang="es-PE" b="1" dirty="0"/>
         </a:p>
@@ -4880,22 +4864,22 @@
     </dgm:pt>
   </dgm:ptLst>
   <dgm:cxnLst>
+    <dgm:cxn modelId="{78C0F103-0BC0-46BC-BBBC-D58341736E99}" type="presOf" srcId="{5D56325C-A28C-4982-810F-F3CCECEC2E7D}" destId="{3C682040-43AF-4BE8-950E-E13003E6C6C7}" srcOrd="0" destOrd="0" presId="urn:microsoft.com/office/officeart/2005/8/layout/list1"/>
+    <dgm:cxn modelId="{2206174B-0967-4701-B7BB-572D079B3A22}" srcId="{3BFDB7AE-EA70-4208-99E4-6652F73E09AF}" destId="{5D56325C-A28C-4982-810F-F3CCECEC2E7D}" srcOrd="0" destOrd="0" parTransId="{5D99972C-BEA3-4759-BAAC-F0514ABC1FE1}" sibTransId="{ECCC7701-505F-42F0-B3C4-E9890A7BB77B}"/>
+    <dgm:cxn modelId="{C611089B-F9C4-4CB8-A2DC-4A6E2B8ECF02}" srcId="{924689B8-E4E2-4802-BC6B-5B17E3AC8DDF}" destId="{A43E1EE4-EA84-469B-B8E9-F87184BCD406}" srcOrd="0" destOrd="0" parTransId="{B5EEE765-35D4-4DF0-BFEC-78B63BE24D65}" sibTransId="{DFDEAEA3-03A5-44E8-ACA1-35C31669F285}"/>
+    <dgm:cxn modelId="{FB20BC1E-834C-48C0-BD4E-04A5E0873844}" srcId="{4D5D3E7B-9F50-4387-AFBC-12316FB9B2E8}" destId="{4C11F0D3-B1D8-41E5-B4ED-D28D5406ED7A}" srcOrd="0" destOrd="0" parTransId="{C60CEBD2-531F-45D5-9CB2-1FBB715F4879}" sibTransId="{A1BF3405-CB09-4D5F-AAD9-E76A127FDC0C}"/>
+    <dgm:cxn modelId="{4219486A-1AA6-4D7C-8DCD-F38DE310E10B}" type="presOf" srcId="{924689B8-E4E2-4802-BC6B-5B17E3AC8DDF}" destId="{E2ADE456-C079-4778-88D3-2ABF030BE345}" srcOrd="0" destOrd="0" presId="urn:microsoft.com/office/officeart/2005/8/layout/list1"/>
+    <dgm:cxn modelId="{26882D24-1258-440C-9950-32BA7E116E89}" type="presOf" srcId="{A43E1EE4-EA84-469B-B8E9-F87184BCD406}" destId="{FC04ED5C-48CE-49A3-98DF-4CA3B004B014}" srcOrd="0" destOrd="0" presId="urn:microsoft.com/office/officeart/2005/8/layout/list1"/>
+    <dgm:cxn modelId="{108E09CC-8703-4C9A-9F4C-239B367EEF86}" type="presOf" srcId="{3BFDB7AE-EA70-4208-99E4-6652F73E09AF}" destId="{501DDC76-9B9F-4697-8027-10EB121BC8A9}" srcOrd="1" destOrd="0" presId="urn:microsoft.com/office/officeart/2005/8/layout/list1"/>
+    <dgm:cxn modelId="{5D020E2A-D409-452B-ABB3-0EFE3A92652C}" type="presOf" srcId="{4C11F0D3-B1D8-41E5-B4ED-D28D5406ED7A}" destId="{C94856A0-C8B1-4244-B645-C266926A0AAB}" srcOrd="0" destOrd="0" presId="urn:microsoft.com/office/officeart/2005/8/layout/list1"/>
+    <dgm:cxn modelId="{9738BE00-F026-4DB2-B7F4-EA1061D3A7FF}" type="presOf" srcId="{3BFDB7AE-EA70-4208-99E4-6652F73E09AF}" destId="{0F91977E-FD5F-4F09-AD28-B3380115D8C3}" srcOrd="0" destOrd="0" presId="urn:microsoft.com/office/officeart/2005/8/layout/list1"/>
+    <dgm:cxn modelId="{D348ABC0-E7C5-475A-B6F1-B134560759E1}" type="presOf" srcId="{4D5D3E7B-9F50-4387-AFBC-12316FB9B2E8}" destId="{F126904A-86E7-4DEB-A715-98702053D074}" srcOrd="0" destOrd="0" presId="urn:microsoft.com/office/officeart/2005/8/layout/list1"/>
+    <dgm:cxn modelId="{3B487C66-25D7-4E41-A5C2-F42C47637A7A}" type="presOf" srcId="{924689B8-E4E2-4802-BC6B-5B17E3AC8DDF}" destId="{E74DBF66-3AE1-4F14-A029-A5F2D0C36F78}" srcOrd="1" destOrd="0" presId="urn:microsoft.com/office/officeart/2005/8/layout/list1"/>
+    <dgm:cxn modelId="{A1CD1BE4-A834-4463-86D1-583A19E39584}" type="presOf" srcId="{9BF01063-3BAB-4F4D-ADE8-387A89D22F7C}" destId="{159D9149-F9AA-45E8-ABA6-7AC56A21C1F8}" srcOrd="0" destOrd="0" presId="urn:microsoft.com/office/officeart/2005/8/layout/list1"/>
+    <dgm:cxn modelId="{DED07964-2F3D-434B-8896-63F590AFB3D4}" srcId="{9BF01063-3BAB-4F4D-ADE8-387A89D22F7C}" destId="{4D5D3E7B-9F50-4387-AFBC-12316FB9B2E8}" srcOrd="0" destOrd="0" parTransId="{4B140464-D0A6-4FE6-BFF1-D92A0DD7F2F3}" sibTransId="{86595B4C-0A5C-4BD5-A6B3-FDB543D91B73}"/>
+    <dgm:cxn modelId="{E344A32A-539A-4B7E-ACFA-95DEF5620BA5}" srcId="{9BF01063-3BAB-4F4D-ADE8-387A89D22F7C}" destId="{3BFDB7AE-EA70-4208-99E4-6652F73E09AF}" srcOrd="1" destOrd="0" parTransId="{54A7580C-2761-4683-A631-30A94395D65A}" sibTransId="{9EFD2A57-70D2-4814-9534-F69C1AAF4BEC}"/>
+    <dgm:cxn modelId="{418BDB1E-B14B-41A7-9D8C-9C6887C8BC7F}" type="presOf" srcId="{4D5D3E7B-9F50-4387-AFBC-12316FB9B2E8}" destId="{15417C44-1630-41CC-AC5B-95723803EAAC}" srcOrd="1" destOrd="0" presId="urn:microsoft.com/office/officeart/2005/8/layout/list1"/>
     <dgm:cxn modelId="{5BEF8FBD-F7BC-444D-94D8-BB8E5A82AA43}" srcId="{9BF01063-3BAB-4F4D-ADE8-387A89D22F7C}" destId="{924689B8-E4E2-4802-BC6B-5B17E3AC8DDF}" srcOrd="2" destOrd="0" parTransId="{670CB166-EC54-4ECF-99EE-166A3C70F39E}" sibTransId="{A9E69FD6-91A0-40D3-96F5-93981AACB6C2}"/>
-    <dgm:cxn modelId="{4219486A-1AA6-4D7C-8DCD-F38DE310E10B}" type="presOf" srcId="{924689B8-E4E2-4802-BC6B-5B17E3AC8DDF}" destId="{E2ADE456-C079-4778-88D3-2ABF030BE345}" srcOrd="0" destOrd="0" presId="urn:microsoft.com/office/officeart/2005/8/layout/list1"/>
-    <dgm:cxn modelId="{A1CD1BE4-A834-4463-86D1-583A19E39584}" type="presOf" srcId="{9BF01063-3BAB-4F4D-ADE8-387A89D22F7C}" destId="{159D9149-F9AA-45E8-ABA6-7AC56A21C1F8}" srcOrd="0" destOrd="0" presId="urn:microsoft.com/office/officeart/2005/8/layout/list1"/>
-    <dgm:cxn modelId="{5D020E2A-D409-452B-ABB3-0EFE3A92652C}" type="presOf" srcId="{4C11F0D3-B1D8-41E5-B4ED-D28D5406ED7A}" destId="{C94856A0-C8B1-4244-B645-C266926A0AAB}" srcOrd="0" destOrd="0" presId="urn:microsoft.com/office/officeart/2005/8/layout/list1"/>
-    <dgm:cxn modelId="{FB20BC1E-834C-48C0-BD4E-04A5E0873844}" srcId="{4D5D3E7B-9F50-4387-AFBC-12316FB9B2E8}" destId="{4C11F0D3-B1D8-41E5-B4ED-D28D5406ED7A}" srcOrd="0" destOrd="0" parTransId="{C60CEBD2-531F-45D5-9CB2-1FBB715F4879}" sibTransId="{A1BF3405-CB09-4D5F-AAD9-E76A127FDC0C}"/>
-    <dgm:cxn modelId="{9738BE00-F026-4DB2-B7F4-EA1061D3A7FF}" type="presOf" srcId="{3BFDB7AE-EA70-4208-99E4-6652F73E09AF}" destId="{0F91977E-FD5F-4F09-AD28-B3380115D8C3}" srcOrd="0" destOrd="0" presId="urn:microsoft.com/office/officeart/2005/8/layout/list1"/>
-    <dgm:cxn modelId="{3B487C66-25D7-4E41-A5C2-F42C47637A7A}" type="presOf" srcId="{924689B8-E4E2-4802-BC6B-5B17E3AC8DDF}" destId="{E74DBF66-3AE1-4F14-A029-A5F2D0C36F78}" srcOrd="1" destOrd="0" presId="urn:microsoft.com/office/officeart/2005/8/layout/list1"/>
-    <dgm:cxn modelId="{26882D24-1258-440C-9950-32BA7E116E89}" type="presOf" srcId="{A43E1EE4-EA84-469B-B8E9-F87184BCD406}" destId="{FC04ED5C-48CE-49A3-98DF-4CA3B004B014}" srcOrd="0" destOrd="0" presId="urn:microsoft.com/office/officeart/2005/8/layout/list1"/>
-    <dgm:cxn modelId="{418BDB1E-B14B-41A7-9D8C-9C6887C8BC7F}" type="presOf" srcId="{4D5D3E7B-9F50-4387-AFBC-12316FB9B2E8}" destId="{15417C44-1630-41CC-AC5B-95723803EAAC}" srcOrd="1" destOrd="0" presId="urn:microsoft.com/office/officeart/2005/8/layout/list1"/>
-    <dgm:cxn modelId="{78C0F103-0BC0-46BC-BBBC-D58341736E99}" type="presOf" srcId="{5D56325C-A28C-4982-810F-F3CCECEC2E7D}" destId="{3C682040-43AF-4BE8-950E-E13003E6C6C7}" srcOrd="0" destOrd="0" presId="urn:microsoft.com/office/officeart/2005/8/layout/list1"/>
-    <dgm:cxn modelId="{E344A32A-539A-4B7E-ACFA-95DEF5620BA5}" srcId="{9BF01063-3BAB-4F4D-ADE8-387A89D22F7C}" destId="{3BFDB7AE-EA70-4208-99E4-6652F73E09AF}" srcOrd="1" destOrd="0" parTransId="{54A7580C-2761-4683-A631-30A94395D65A}" sibTransId="{9EFD2A57-70D2-4814-9534-F69C1AAF4BEC}"/>
-    <dgm:cxn modelId="{108E09CC-8703-4C9A-9F4C-239B367EEF86}" type="presOf" srcId="{3BFDB7AE-EA70-4208-99E4-6652F73E09AF}" destId="{501DDC76-9B9F-4697-8027-10EB121BC8A9}" srcOrd="1" destOrd="0" presId="urn:microsoft.com/office/officeart/2005/8/layout/list1"/>
-    <dgm:cxn modelId="{DED07964-2F3D-434B-8896-63F590AFB3D4}" srcId="{9BF01063-3BAB-4F4D-ADE8-387A89D22F7C}" destId="{4D5D3E7B-9F50-4387-AFBC-12316FB9B2E8}" srcOrd="0" destOrd="0" parTransId="{4B140464-D0A6-4FE6-BFF1-D92A0DD7F2F3}" sibTransId="{86595B4C-0A5C-4BD5-A6B3-FDB543D91B73}"/>
-    <dgm:cxn modelId="{2206174B-0967-4701-B7BB-572D079B3A22}" srcId="{3BFDB7AE-EA70-4208-99E4-6652F73E09AF}" destId="{5D56325C-A28C-4982-810F-F3CCECEC2E7D}" srcOrd="0" destOrd="0" parTransId="{5D99972C-BEA3-4759-BAAC-F0514ABC1FE1}" sibTransId="{ECCC7701-505F-42F0-B3C4-E9890A7BB77B}"/>
-    <dgm:cxn modelId="{D348ABC0-E7C5-475A-B6F1-B134560759E1}" type="presOf" srcId="{4D5D3E7B-9F50-4387-AFBC-12316FB9B2E8}" destId="{F126904A-86E7-4DEB-A715-98702053D074}" srcOrd="0" destOrd="0" presId="urn:microsoft.com/office/officeart/2005/8/layout/list1"/>
-    <dgm:cxn modelId="{C611089B-F9C4-4CB8-A2DC-4A6E2B8ECF02}" srcId="{924689B8-E4E2-4802-BC6B-5B17E3AC8DDF}" destId="{A43E1EE4-EA84-469B-B8E9-F87184BCD406}" srcOrd="0" destOrd="0" parTransId="{B5EEE765-35D4-4DF0-BFEC-78B63BE24D65}" sibTransId="{DFDEAEA3-03A5-44E8-ACA1-35C31669F285}"/>
     <dgm:cxn modelId="{BE00BBB3-1184-461B-97F7-D315BDD3D691}" type="presParOf" srcId="{159D9149-F9AA-45E8-ABA6-7AC56A21C1F8}" destId="{1063D51E-A931-450E-B6C9-26E16E6105C8}" srcOrd="0" destOrd="0" presId="urn:microsoft.com/office/officeart/2005/8/layout/list1"/>
     <dgm:cxn modelId="{79CF50A7-E302-42DE-B4FA-14593CA58892}" type="presParOf" srcId="{1063D51E-A931-450E-B6C9-26E16E6105C8}" destId="{F126904A-86E7-4DEB-A715-98702053D074}" srcOrd="0" destOrd="0" presId="urn:microsoft.com/office/officeart/2005/8/layout/list1"/>
     <dgm:cxn modelId="{3ABCB8CF-0045-4A73-BD75-619AA227F38A}" type="presParOf" srcId="{1063D51E-A931-450E-B6C9-26E16E6105C8}" destId="{15417C44-1630-41CC-AC5B-95723803EAAC}" srcOrd="1" destOrd="0" presId="urn:microsoft.com/office/officeart/2005/8/layout/list1"/>
@@ -5288,7 +5272,11 @@
         <a:p>
           <a:r>
             <a:rPr lang="es-ES_tradnl" sz="1400" dirty="0" smtClean="0"/>
-            <a:t>Cuadro comparativo entre herramientas y tecnologías disponibles a fin de seleccionar aquellas que se van a utilizar en el proyecto.</a:t>
+            <a:t>Documento y cuadro </a:t>
+          </a:r>
+          <a:r>
+            <a:rPr lang="es-ES_tradnl" sz="1400" dirty="0" smtClean="0"/>
+            <a:t>comparativo entre herramientas y tecnologías disponibles a fin de seleccionar aquellas que se van a utilizar en el proyecto.</a:t>
           </a:r>
           <a:endParaRPr lang="es-PE" sz="1400" dirty="0"/>
         </a:p>
@@ -6404,11 +6392,7 @@
           </a:pPr>
           <a:r>
             <a:rPr lang="es-PE" sz="2000" b="1" kern="1200" dirty="0" smtClean="0"/>
-            <a:t>Objetivo Específico </a:t>
-          </a:r>
-          <a:r>
-            <a:rPr lang="es-PE" sz="2000" b="1" kern="1200" dirty="0" smtClean="0"/>
-            <a:t>2 [OE2]</a:t>
+            <a:t>Objetivo Específico 2 [OE2]</a:t>
           </a:r>
           <a:endParaRPr lang="es-PE" sz="2000" b="1" kern="1200" dirty="0"/>
         </a:p>
@@ -6613,19 +6597,7 @@
           </a:pPr>
           <a:r>
             <a:rPr lang="es-PE" sz="2000" b="1" kern="1200" dirty="0" smtClean="0"/>
-            <a:t>Objetivo Específico </a:t>
-          </a:r>
-          <a:r>
-            <a:rPr lang="es-PE" sz="2000" b="1" kern="1200" dirty="0" smtClean="0"/>
-            <a:t>3 </a:t>
-          </a:r>
-          <a:r>
-            <a:rPr lang="es-PE" sz="2000" b="1" kern="1200" dirty="0" smtClean="0"/>
-            <a:t>[</a:t>
-          </a:r>
-          <a:r>
-            <a:rPr lang="es-PE" sz="2000" b="1" kern="1200" dirty="0" smtClean="0"/>
-            <a:t>OE3]</a:t>
+            <a:t>Objetivo Específico 3 [OE3]</a:t>
           </a:r>
           <a:endParaRPr lang="es-PE" sz="2000" b="1" kern="1200" dirty="0"/>
         </a:p>
@@ -7884,7 +7856,11 @@
           </a:pPr>
           <a:r>
             <a:rPr lang="es-ES_tradnl" sz="1400" kern="1200" dirty="0" smtClean="0"/>
-            <a:t>Cuadro comparativo entre herramientas y tecnologías disponibles a fin de seleccionar aquellas que se van a utilizar en el proyecto.</a:t>
+            <a:t>Documento y cuadro </a:t>
+          </a:r>
+          <a:r>
+            <a:rPr lang="es-ES_tradnl" sz="1400" kern="1200" dirty="0" smtClean="0"/>
+            <a:t>comparativo entre herramientas y tecnologías disponibles a fin de seleccionar aquellas que se van a utilizar en el proyecto.</a:t>
           </a:r>
           <a:endParaRPr lang="es-PE" sz="1400" kern="1200" dirty="0"/>
         </a:p>
@@ -18466,7 +18442,7 @@
               <a:pPr>
                 <a:defRPr/>
               </a:pPr>
-              <a:t>11/10/2013</a:t>
+              <a:t>12/10/2013</a:t>
             </a:fld>
             <a:endParaRPr lang="es-PE"/>
           </a:p>
@@ -18664,7 +18640,7 @@
               <a:pPr>
                 <a:defRPr/>
               </a:pPr>
-              <a:t>11/10/2013</a:t>
+              <a:t>12/10/2013</a:t>
             </a:fld>
             <a:endParaRPr lang="es-PE"/>
           </a:p>
@@ -18871,7 +18847,7 @@
               <a:pPr>
                 <a:defRPr/>
               </a:pPr>
-              <a:t>11/10/2013</a:t>
+              <a:t>12/10/2013</a:t>
             </a:fld>
             <a:endParaRPr lang="es-PE"/>
           </a:p>
@@ -20316,7 +20292,7 @@
               <a:pPr>
                 <a:defRPr/>
               </a:pPr>
-              <a:t>11/10/2013</a:t>
+              <a:t>12/10/2013</a:t>
             </a:fld>
             <a:endParaRPr lang="es-PE"/>
           </a:p>
@@ -22551,7 +22527,7 @@
               <a:pPr>
                 <a:defRPr/>
               </a:pPr>
-              <a:t>11/10/2013</a:t>
+              <a:t>12/10/2013</a:t>
             </a:fld>
             <a:endParaRPr lang="es-PE"/>
           </a:p>
@@ -24790,7 +24766,7 @@
               <a:pPr>
                 <a:defRPr/>
               </a:pPr>
-              <a:t>11/10/2013</a:t>
+              <a:t>12/10/2013</a:t>
             </a:fld>
             <a:endParaRPr lang="es-PE"/>
           </a:p>
@@ -26859,7 +26835,7 @@
               <a:pPr>
                 <a:defRPr/>
               </a:pPr>
-              <a:t>11/10/2013</a:t>
+              <a:t>12/10/2013</a:t>
             </a:fld>
             <a:endParaRPr lang="es-PE"/>
           </a:p>
@@ -28399,7 +28375,7 @@
               <a:pPr>
                 <a:defRPr/>
               </a:pPr>
-              <a:t>11/10/2013</a:t>
+              <a:t>12/10/2013</a:t>
             </a:fld>
             <a:endParaRPr lang="es-PE"/>
           </a:p>
@@ -28521,7 +28497,7 @@
               <a:pPr>
                 <a:defRPr/>
               </a:pPr>
-              <a:t>11/10/2013</a:t>
+              <a:t>12/10/2013</a:t>
             </a:fld>
             <a:endParaRPr lang="es-PE"/>
           </a:p>
@@ -28825,7 +28801,7 @@
               <a:pPr>
                 <a:defRPr/>
               </a:pPr>
-              <a:t>11/10/2013</a:t>
+              <a:t>12/10/2013</a:t>
             </a:fld>
             <a:endParaRPr lang="es-PE"/>
           </a:p>
@@ -29108,7 +29084,7 @@
               <a:pPr>
                 <a:defRPr/>
               </a:pPr>
-              <a:t>11/10/2013</a:t>
+              <a:t>12/10/2013</a:t>
             </a:fld>
             <a:endParaRPr lang="es-PE"/>
           </a:p>
@@ -29395,7 +29371,7 @@
               <a:pPr>
                 <a:defRPr/>
               </a:pPr>
-              <a:t>11/10/2013</a:t>
+              <a:t>12/10/2013</a:t>
             </a:fld>
             <a:endParaRPr lang="es-PE"/>
           </a:p>
@@ -44115,7 +44091,7 @@
           <p:nvPr>
             <p:extLst>
               <p:ext uri="{D42A27DB-BD31-4B8C-83A1-F6EECF244321}">
-                <p14:modId xmlns:p14="http://schemas.microsoft.com/office/powerpoint/2010/main" val="2629592219"/>
+                <p14:modId xmlns:p14="http://schemas.microsoft.com/office/powerpoint/2010/main" val="668466049"/>
               </p:ext>
             </p:extLst>
           </p:nvPr>

</xml_diff>

<commit_message>
Compra Virtual 100% Plan de Proyecto
</commit_message>
<xml_diff>
--- a/Documentación/Presentaciones PPT/Tesis 2 - Mendez Presentación.pptx
+++ b/Documentación/Presentaciones PPT/Tesis 2 - Mendez Presentación.pptx
@@ -4864,22 +4864,22 @@
     </dgm:pt>
   </dgm:ptLst>
   <dgm:cxnLst>
+    <dgm:cxn modelId="{5BEF8FBD-F7BC-444D-94D8-BB8E5A82AA43}" srcId="{9BF01063-3BAB-4F4D-ADE8-387A89D22F7C}" destId="{924689B8-E4E2-4802-BC6B-5B17E3AC8DDF}" srcOrd="2" destOrd="0" parTransId="{670CB166-EC54-4ECF-99EE-166A3C70F39E}" sibTransId="{A9E69FD6-91A0-40D3-96F5-93981AACB6C2}"/>
+    <dgm:cxn modelId="{4219486A-1AA6-4D7C-8DCD-F38DE310E10B}" type="presOf" srcId="{924689B8-E4E2-4802-BC6B-5B17E3AC8DDF}" destId="{E2ADE456-C079-4778-88D3-2ABF030BE345}" srcOrd="0" destOrd="0" presId="urn:microsoft.com/office/officeart/2005/8/layout/list1"/>
+    <dgm:cxn modelId="{A1CD1BE4-A834-4463-86D1-583A19E39584}" type="presOf" srcId="{9BF01063-3BAB-4F4D-ADE8-387A89D22F7C}" destId="{159D9149-F9AA-45E8-ABA6-7AC56A21C1F8}" srcOrd="0" destOrd="0" presId="urn:microsoft.com/office/officeart/2005/8/layout/list1"/>
+    <dgm:cxn modelId="{5D020E2A-D409-452B-ABB3-0EFE3A92652C}" type="presOf" srcId="{4C11F0D3-B1D8-41E5-B4ED-D28D5406ED7A}" destId="{C94856A0-C8B1-4244-B645-C266926A0AAB}" srcOrd="0" destOrd="0" presId="urn:microsoft.com/office/officeart/2005/8/layout/list1"/>
+    <dgm:cxn modelId="{FB20BC1E-834C-48C0-BD4E-04A5E0873844}" srcId="{4D5D3E7B-9F50-4387-AFBC-12316FB9B2E8}" destId="{4C11F0D3-B1D8-41E5-B4ED-D28D5406ED7A}" srcOrd="0" destOrd="0" parTransId="{C60CEBD2-531F-45D5-9CB2-1FBB715F4879}" sibTransId="{A1BF3405-CB09-4D5F-AAD9-E76A127FDC0C}"/>
+    <dgm:cxn modelId="{9738BE00-F026-4DB2-B7F4-EA1061D3A7FF}" type="presOf" srcId="{3BFDB7AE-EA70-4208-99E4-6652F73E09AF}" destId="{0F91977E-FD5F-4F09-AD28-B3380115D8C3}" srcOrd="0" destOrd="0" presId="urn:microsoft.com/office/officeart/2005/8/layout/list1"/>
+    <dgm:cxn modelId="{3B487C66-25D7-4E41-A5C2-F42C47637A7A}" type="presOf" srcId="{924689B8-E4E2-4802-BC6B-5B17E3AC8DDF}" destId="{E74DBF66-3AE1-4F14-A029-A5F2D0C36F78}" srcOrd="1" destOrd="0" presId="urn:microsoft.com/office/officeart/2005/8/layout/list1"/>
+    <dgm:cxn modelId="{26882D24-1258-440C-9950-32BA7E116E89}" type="presOf" srcId="{A43E1EE4-EA84-469B-B8E9-F87184BCD406}" destId="{FC04ED5C-48CE-49A3-98DF-4CA3B004B014}" srcOrd="0" destOrd="0" presId="urn:microsoft.com/office/officeart/2005/8/layout/list1"/>
+    <dgm:cxn modelId="{418BDB1E-B14B-41A7-9D8C-9C6887C8BC7F}" type="presOf" srcId="{4D5D3E7B-9F50-4387-AFBC-12316FB9B2E8}" destId="{15417C44-1630-41CC-AC5B-95723803EAAC}" srcOrd="1" destOrd="0" presId="urn:microsoft.com/office/officeart/2005/8/layout/list1"/>
     <dgm:cxn modelId="{78C0F103-0BC0-46BC-BBBC-D58341736E99}" type="presOf" srcId="{5D56325C-A28C-4982-810F-F3CCECEC2E7D}" destId="{3C682040-43AF-4BE8-950E-E13003E6C6C7}" srcOrd="0" destOrd="0" presId="urn:microsoft.com/office/officeart/2005/8/layout/list1"/>
+    <dgm:cxn modelId="{E344A32A-539A-4B7E-ACFA-95DEF5620BA5}" srcId="{9BF01063-3BAB-4F4D-ADE8-387A89D22F7C}" destId="{3BFDB7AE-EA70-4208-99E4-6652F73E09AF}" srcOrd="1" destOrd="0" parTransId="{54A7580C-2761-4683-A631-30A94395D65A}" sibTransId="{9EFD2A57-70D2-4814-9534-F69C1AAF4BEC}"/>
+    <dgm:cxn modelId="{108E09CC-8703-4C9A-9F4C-239B367EEF86}" type="presOf" srcId="{3BFDB7AE-EA70-4208-99E4-6652F73E09AF}" destId="{501DDC76-9B9F-4697-8027-10EB121BC8A9}" srcOrd="1" destOrd="0" presId="urn:microsoft.com/office/officeart/2005/8/layout/list1"/>
+    <dgm:cxn modelId="{DED07964-2F3D-434B-8896-63F590AFB3D4}" srcId="{9BF01063-3BAB-4F4D-ADE8-387A89D22F7C}" destId="{4D5D3E7B-9F50-4387-AFBC-12316FB9B2E8}" srcOrd="0" destOrd="0" parTransId="{4B140464-D0A6-4FE6-BFF1-D92A0DD7F2F3}" sibTransId="{86595B4C-0A5C-4BD5-A6B3-FDB543D91B73}"/>
     <dgm:cxn modelId="{2206174B-0967-4701-B7BB-572D079B3A22}" srcId="{3BFDB7AE-EA70-4208-99E4-6652F73E09AF}" destId="{5D56325C-A28C-4982-810F-F3CCECEC2E7D}" srcOrd="0" destOrd="0" parTransId="{5D99972C-BEA3-4759-BAAC-F0514ABC1FE1}" sibTransId="{ECCC7701-505F-42F0-B3C4-E9890A7BB77B}"/>
+    <dgm:cxn modelId="{D348ABC0-E7C5-475A-B6F1-B134560759E1}" type="presOf" srcId="{4D5D3E7B-9F50-4387-AFBC-12316FB9B2E8}" destId="{F126904A-86E7-4DEB-A715-98702053D074}" srcOrd="0" destOrd="0" presId="urn:microsoft.com/office/officeart/2005/8/layout/list1"/>
     <dgm:cxn modelId="{C611089B-F9C4-4CB8-A2DC-4A6E2B8ECF02}" srcId="{924689B8-E4E2-4802-BC6B-5B17E3AC8DDF}" destId="{A43E1EE4-EA84-469B-B8E9-F87184BCD406}" srcOrd="0" destOrd="0" parTransId="{B5EEE765-35D4-4DF0-BFEC-78B63BE24D65}" sibTransId="{DFDEAEA3-03A5-44E8-ACA1-35C31669F285}"/>
-    <dgm:cxn modelId="{FB20BC1E-834C-48C0-BD4E-04A5E0873844}" srcId="{4D5D3E7B-9F50-4387-AFBC-12316FB9B2E8}" destId="{4C11F0D3-B1D8-41E5-B4ED-D28D5406ED7A}" srcOrd="0" destOrd="0" parTransId="{C60CEBD2-531F-45D5-9CB2-1FBB715F4879}" sibTransId="{A1BF3405-CB09-4D5F-AAD9-E76A127FDC0C}"/>
-    <dgm:cxn modelId="{4219486A-1AA6-4D7C-8DCD-F38DE310E10B}" type="presOf" srcId="{924689B8-E4E2-4802-BC6B-5B17E3AC8DDF}" destId="{E2ADE456-C079-4778-88D3-2ABF030BE345}" srcOrd="0" destOrd="0" presId="urn:microsoft.com/office/officeart/2005/8/layout/list1"/>
-    <dgm:cxn modelId="{26882D24-1258-440C-9950-32BA7E116E89}" type="presOf" srcId="{A43E1EE4-EA84-469B-B8E9-F87184BCD406}" destId="{FC04ED5C-48CE-49A3-98DF-4CA3B004B014}" srcOrd="0" destOrd="0" presId="urn:microsoft.com/office/officeart/2005/8/layout/list1"/>
-    <dgm:cxn modelId="{108E09CC-8703-4C9A-9F4C-239B367EEF86}" type="presOf" srcId="{3BFDB7AE-EA70-4208-99E4-6652F73E09AF}" destId="{501DDC76-9B9F-4697-8027-10EB121BC8A9}" srcOrd="1" destOrd="0" presId="urn:microsoft.com/office/officeart/2005/8/layout/list1"/>
-    <dgm:cxn modelId="{5D020E2A-D409-452B-ABB3-0EFE3A92652C}" type="presOf" srcId="{4C11F0D3-B1D8-41E5-B4ED-D28D5406ED7A}" destId="{C94856A0-C8B1-4244-B645-C266926A0AAB}" srcOrd="0" destOrd="0" presId="urn:microsoft.com/office/officeart/2005/8/layout/list1"/>
-    <dgm:cxn modelId="{9738BE00-F026-4DB2-B7F4-EA1061D3A7FF}" type="presOf" srcId="{3BFDB7AE-EA70-4208-99E4-6652F73E09AF}" destId="{0F91977E-FD5F-4F09-AD28-B3380115D8C3}" srcOrd="0" destOrd="0" presId="urn:microsoft.com/office/officeart/2005/8/layout/list1"/>
-    <dgm:cxn modelId="{D348ABC0-E7C5-475A-B6F1-B134560759E1}" type="presOf" srcId="{4D5D3E7B-9F50-4387-AFBC-12316FB9B2E8}" destId="{F126904A-86E7-4DEB-A715-98702053D074}" srcOrd="0" destOrd="0" presId="urn:microsoft.com/office/officeart/2005/8/layout/list1"/>
-    <dgm:cxn modelId="{3B487C66-25D7-4E41-A5C2-F42C47637A7A}" type="presOf" srcId="{924689B8-E4E2-4802-BC6B-5B17E3AC8DDF}" destId="{E74DBF66-3AE1-4F14-A029-A5F2D0C36F78}" srcOrd="1" destOrd="0" presId="urn:microsoft.com/office/officeart/2005/8/layout/list1"/>
-    <dgm:cxn modelId="{A1CD1BE4-A834-4463-86D1-583A19E39584}" type="presOf" srcId="{9BF01063-3BAB-4F4D-ADE8-387A89D22F7C}" destId="{159D9149-F9AA-45E8-ABA6-7AC56A21C1F8}" srcOrd="0" destOrd="0" presId="urn:microsoft.com/office/officeart/2005/8/layout/list1"/>
-    <dgm:cxn modelId="{DED07964-2F3D-434B-8896-63F590AFB3D4}" srcId="{9BF01063-3BAB-4F4D-ADE8-387A89D22F7C}" destId="{4D5D3E7B-9F50-4387-AFBC-12316FB9B2E8}" srcOrd="0" destOrd="0" parTransId="{4B140464-D0A6-4FE6-BFF1-D92A0DD7F2F3}" sibTransId="{86595B4C-0A5C-4BD5-A6B3-FDB543D91B73}"/>
-    <dgm:cxn modelId="{E344A32A-539A-4B7E-ACFA-95DEF5620BA5}" srcId="{9BF01063-3BAB-4F4D-ADE8-387A89D22F7C}" destId="{3BFDB7AE-EA70-4208-99E4-6652F73E09AF}" srcOrd="1" destOrd="0" parTransId="{54A7580C-2761-4683-A631-30A94395D65A}" sibTransId="{9EFD2A57-70D2-4814-9534-F69C1AAF4BEC}"/>
-    <dgm:cxn modelId="{418BDB1E-B14B-41A7-9D8C-9C6887C8BC7F}" type="presOf" srcId="{4D5D3E7B-9F50-4387-AFBC-12316FB9B2E8}" destId="{15417C44-1630-41CC-AC5B-95723803EAAC}" srcOrd="1" destOrd="0" presId="urn:microsoft.com/office/officeart/2005/8/layout/list1"/>
-    <dgm:cxn modelId="{5BEF8FBD-F7BC-444D-94D8-BB8E5A82AA43}" srcId="{9BF01063-3BAB-4F4D-ADE8-387A89D22F7C}" destId="{924689B8-E4E2-4802-BC6B-5B17E3AC8DDF}" srcOrd="2" destOrd="0" parTransId="{670CB166-EC54-4ECF-99EE-166A3C70F39E}" sibTransId="{A9E69FD6-91A0-40D3-96F5-93981AACB6C2}"/>
     <dgm:cxn modelId="{BE00BBB3-1184-461B-97F7-D315BDD3D691}" type="presParOf" srcId="{159D9149-F9AA-45E8-ABA6-7AC56A21C1F8}" destId="{1063D51E-A931-450E-B6C9-26E16E6105C8}" srcOrd="0" destOrd="0" presId="urn:microsoft.com/office/officeart/2005/8/layout/list1"/>
     <dgm:cxn modelId="{79CF50A7-E302-42DE-B4FA-14593CA58892}" type="presParOf" srcId="{1063D51E-A931-450E-B6C9-26E16E6105C8}" destId="{F126904A-86E7-4DEB-A715-98702053D074}" srcOrd="0" destOrd="0" presId="urn:microsoft.com/office/officeart/2005/8/layout/list1"/>
     <dgm:cxn modelId="{3ABCB8CF-0045-4A73-BD75-619AA227F38A}" type="presParOf" srcId="{1063D51E-A931-450E-B6C9-26E16E6105C8}" destId="{15417C44-1630-41CC-AC5B-95723803EAAC}" srcOrd="1" destOrd="0" presId="urn:microsoft.com/office/officeart/2005/8/layout/list1"/>
@@ -5272,11 +5272,7 @@
         <a:p>
           <a:r>
             <a:rPr lang="es-ES_tradnl" sz="1400" dirty="0" smtClean="0"/>
-            <a:t>Documento y cuadro </a:t>
-          </a:r>
-          <a:r>
-            <a:rPr lang="es-ES_tradnl" sz="1400" dirty="0" smtClean="0"/>
-            <a:t>comparativo entre herramientas y tecnologías disponibles a fin de seleccionar aquellas que se van a utilizar en el proyecto.</a:t>
+            <a:t>Documento y cuadro comparativo entre herramientas y tecnologías disponibles a fin de seleccionar aquellas que se van a utilizar en el proyecto.</a:t>
           </a:r>
           <a:endParaRPr lang="es-PE" sz="1400" dirty="0"/>
         </a:p>
@@ -7856,11 +7852,7 @@
           </a:pPr>
           <a:r>
             <a:rPr lang="es-ES_tradnl" sz="1400" kern="1200" dirty="0" smtClean="0"/>
-            <a:t>Documento y cuadro </a:t>
-          </a:r>
-          <a:r>
-            <a:rPr lang="es-ES_tradnl" sz="1400" kern="1200" dirty="0" smtClean="0"/>
-            <a:t>comparativo entre herramientas y tecnologías disponibles a fin de seleccionar aquellas que se van a utilizar en el proyecto.</a:t>
+            <a:t>Documento y cuadro comparativo entre herramientas y tecnologías disponibles a fin de seleccionar aquellas que se van a utilizar en el proyecto.</a:t>
           </a:r>
           <a:endParaRPr lang="es-PE" sz="1400" kern="1200" dirty="0"/>
         </a:p>
@@ -18442,7 +18434,7 @@
               <a:pPr>
                 <a:defRPr/>
               </a:pPr>
-              <a:t>12/10/2013</a:t>
+              <a:t>26/10/2013</a:t>
             </a:fld>
             <a:endParaRPr lang="es-PE"/>
           </a:p>
@@ -18640,7 +18632,7 @@
               <a:pPr>
                 <a:defRPr/>
               </a:pPr>
-              <a:t>12/10/2013</a:t>
+              <a:t>26/10/2013</a:t>
             </a:fld>
             <a:endParaRPr lang="es-PE"/>
           </a:p>
@@ -18847,7 +18839,7 @@
               <a:pPr>
                 <a:defRPr/>
               </a:pPr>
-              <a:t>12/10/2013</a:t>
+              <a:t>26/10/2013</a:t>
             </a:fld>
             <a:endParaRPr lang="es-PE"/>
           </a:p>
@@ -20292,7 +20284,7 @@
               <a:pPr>
                 <a:defRPr/>
               </a:pPr>
-              <a:t>12/10/2013</a:t>
+              <a:t>26/10/2013</a:t>
             </a:fld>
             <a:endParaRPr lang="es-PE"/>
           </a:p>
@@ -22527,7 +22519,7 @@
               <a:pPr>
                 <a:defRPr/>
               </a:pPr>
-              <a:t>12/10/2013</a:t>
+              <a:t>26/10/2013</a:t>
             </a:fld>
             <a:endParaRPr lang="es-PE"/>
           </a:p>
@@ -24766,7 +24758,7 @@
               <a:pPr>
                 <a:defRPr/>
               </a:pPr>
-              <a:t>12/10/2013</a:t>
+              <a:t>26/10/2013</a:t>
             </a:fld>
             <a:endParaRPr lang="es-PE"/>
           </a:p>
@@ -26835,7 +26827,7 @@
               <a:pPr>
                 <a:defRPr/>
               </a:pPr>
-              <a:t>12/10/2013</a:t>
+              <a:t>26/10/2013</a:t>
             </a:fld>
             <a:endParaRPr lang="es-PE"/>
           </a:p>
@@ -28375,7 +28367,7 @@
               <a:pPr>
                 <a:defRPr/>
               </a:pPr>
-              <a:t>12/10/2013</a:t>
+              <a:t>26/10/2013</a:t>
             </a:fld>
             <a:endParaRPr lang="es-PE"/>
           </a:p>
@@ -28497,7 +28489,7 @@
               <a:pPr>
                 <a:defRPr/>
               </a:pPr>
-              <a:t>12/10/2013</a:t>
+              <a:t>26/10/2013</a:t>
             </a:fld>
             <a:endParaRPr lang="es-PE"/>
           </a:p>
@@ -28801,7 +28793,7 @@
               <a:pPr>
                 <a:defRPr/>
               </a:pPr>
-              <a:t>12/10/2013</a:t>
+              <a:t>26/10/2013</a:t>
             </a:fld>
             <a:endParaRPr lang="es-PE"/>
           </a:p>
@@ -29084,7 +29076,7 @@
               <a:pPr>
                 <a:defRPr/>
               </a:pPr>
-              <a:t>12/10/2013</a:t>
+              <a:t>26/10/2013</a:t>
             </a:fld>
             <a:endParaRPr lang="es-PE"/>
           </a:p>
@@ -29371,7 +29363,7 @@
               <a:pPr>
                 <a:defRPr/>
               </a:pPr>
-              <a:t>12/10/2013</a:t>
+              <a:t>26/10/2013</a:t>
             </a:fld>
             <a:endParaRPr lang="es-PE"/>
           </a:p>
@@ -40293,15 +40285,16 @@
                   <a:srgbClr val="000000"/>
                 </a:solidFill>
               </a:rPr>
-              <a:t>ANÁLISIS, DISEÑO E IMPLEMENTACIÓN DE UN SISTEMA DE INFORMACIÓN PARA LA GESTIÓN DE ENTREGA DE SERVICIOS GENERALES Y MANTENIMIENTO A HOGARES</a:t>
-            </a:r>
-          </a:p>
-          <a:p>
-            <a:pPr lvl="0" algn="ctr">
-              <a:lnSpc>
-                <a:spcPct val="110000"/>
-              </a:lnSpc>
-            </a:pPr>
+              <a:t>ANÁLISIS, DISEÑO E IMPLEMENTACIÓN DE UN SISTEMA DE INFORMACIÓN PARA LA GESTIÓN DE ENTREGA DE SERVICIOS </a:t>
+            </a:r>
+            <a:r>
+              <a:rPr lang="es-PE" sz="2000" b="1" dirty="0" smtClean="0">
+                <a:solidFill>
+                  <a:srgbClr val="000000"/>
+                </a:solidFill>
+              </a:rPr>
+              <a:t>GENERALES</a:t>
+            </a:r>
             <a:endParaRPr lang="pt-BR" sz="2400" b="1" dirty="0">
               <a:solidFill>
                 <a:srgbClr val="000000"/>

</xml_diff>